<commit_message>
correct $ -> \ #268
</commit_message>
<xml_diff>
--- a/source/ArchitectureInDetail/images_CodeList/materialCodeList.pptx
+++ b/source/ArchitectureInDetail/images_CodeList/materialCodeList.pptx
@@ -196,7 +196,7 @@
             <a:fld id="{3BB47352-BF5A-4CD2-B029-996118CD8E01}" type="datetimeFigureOut">
               <a:rPr kumimoji="1" lang="ja-JP" altLang="en-US" smtClean="0"/>
               <a:pPr/>
-              <a:t>2014/3/27</a:t>
+              <a:t>2014/10/2</a:t>
             </a:fld>
             <a:endParaRPr kumimoji="1" lang="ja-JP" altLang="en-US" dirty="0"/>
           </a:p>
@@ -388,7 +388,7 @@
             <a:fld id="{003CFFA3-9D07-4088-826B-DF328166082C}" type="slidenum">
               <a:rPr kumimoji="1" lang="ja-JP" altLang="en-US" smtClean="0"/>
               <a:pPr/>
-              <a:t>‹#›</a:t>
+              <a:t>&lt;#&gt;</a:t>
             </a:fld>
             <a:endParaRPr kumimoji="1" lang="ja-JP" altLang="en-US" dirty="0"/>
           </a:p>
@@ -397,7 +397,7 @@
     </p:spTree>
     <p:extLst>
       <p:ext uri="{BB962C8B-B14F-4D97-AF65-F5344CB8AC3E}">
-        <p14:creationId xmlns:p14="http://schemas.microsoft.com/office/powerpoint/2010/main" val="1563212060"/>
+        <p14:creationId xmlns:p14="http://schemas.microsoft.com/office/powerpoint/2010/main" xmlns="" val="1563212060"/>
       </p:ext>
     </p:extLst>
   </p:cSld>
@@ -679,7 +679,7 @@
             <a:fld id="{7B9B12EC-6AA0-374B-A2D3-850081A07A26}" type="datetimeFigureOut">
               <a:rPr kumimoji="1" lang="ja-JP" altLang="en-US" smtClean="0"/>
               <a:pPr/>
-              <a:t>2014/3/27</a:t>
+              <a:t>2014/10/2</a:t>
             </a:fld>
             <a:endParaRPr kumimoji="1" lang="ja-JP" altLang="en-US" dirty="0"/>
           </a:p>
@@ -722,7 +722,7 @@
             <a:fld id="{767EF739-006C-E447-A3B9-2B495A864FAC}" type="slidenum">
               <a:rPr kumimoji="1" lang="ja-JP" altLang="en-US" smtClean="0"/>
               <a:pPr/>
-              <a:t>‹#›</a:t>
+              <a:t>&lt;#&gt;</a:t>
             </a:fld>
             <a:endParaRPr kumimoji="1" lang="ja-JP" altLang="en-US" dirty="0"/>
           </a:p>
@@ -731,7 +731,7 @@
     </p:spTree>
     <p:extLst>
       <p:ext uri="{BB962C8B-B14F-4D97-AF65-F5344CB8AC3E}">
-        <p14:creationId xmlns:p14="http://schemas.microsoft.com/office/powerpoint/2010/main" val="2957268178"/>
+        <p14:creationId xmlns:p14="http://schemas.microsoft.com/office/powerpoint/2010/main" xmlns="" val="2957268178"/>
       </p:ext>
     </p:extLst>
   </p:cSld>
@@ -883,7 +883,7 @@
             <a:fld id="{7B9B12EC-6AA0-374B-A2D3-850081A07A26}" type="datetimeFigureOut">
               <a:rPr kumimoji="1" lang="ja-JP" altLang="en-US" smtClean="0"/>
               <a:pPr/>
-              <a:t>2014/3/27</a:t>
+              <a:t>2014/10/2</a:t>
             </a:fld>
             <a:endParaRPr kumimoji="1" lang="ja-JP" altLang="en-US" dirty="0"/>
           </a:p>
@@ -926,7 +926,7 @@
             <a:fld id="{767EF739-006C-E447-A3B9-2B495A864FAC}" type="slidenum">
               <a:rPr kumimoji="1" lang="ja-JP" altLang="en-US" smtClean="0"/>
               <a:pPr/>
-              <a:t>‹#›</a:t>
+              <a:t>&lt;#&gt;</a:t>
             </a:fld>
             <a:endParaRPr kumimoji="1" lang="ja-JP" altLang="en-US" dirty="0"/>
           </a:p>
@@ -935,7 +935,7 @@
     </p:spTree>
     <p:extLst>
       <p:ext uri="{BB962C8B-B14F-4D97-AF65-F5344CB8AC3E}">
-        <p14:creationId xmlns:p14="http://schemas.microsoft.com/office/powerpoint/2010/main" val="99248395"/>
+        <p14:creationId xmlns:p14="http://schemas.microsoft.com/office/powerpoint/2010/main" xmlns="" val="99248395"/>
       </p:ext>
     </p:extLst>
   </p:cSld>
@@ -1097,7 +1097,7 @@
             <a:fld id="{7B9B12EC-6AA0-374B-A2D3-850081A07A26}" type="datetimeFigureOut">
               <a:rPr kumimoji="1" lang="ja-JP" altLang="en-US" smtClean="0"/>
               <a:pPr/>
-              <a:t>2014/3/27</a:t>
+              <a:t>2014/10/2</a:t>
             </a:fld>
             <a:endParaRPr kumimoji="1" lang="ja-JP" altLang="en-US" dirty="0"/>
           </a:p>
@@ -1140,7 +1140,7 @@
             <a:fld id="{767EF739-006C-E447-A3B9-2B495A864FAC}" type="slidenum">
               <a:rPr kumimoji="1" lang="ja-JP" altLang="en-US" smtClean="0"/>
               <a:pPr/>
-              <a:t>‹#›</a:t>
+              <a:t>&lt;#&gt;</a:t>
             </a:fld>
             <a:endParaRPr kumimoji="1" lang="ja-JP" altLang="en-US" dirty="0"/>
           </a:p>
@@ -1149,7 +1149,7 @@
     </p:spTree>
     <p:extLst>
       <p:ext uri="{BB962C8B-B14F-4D97-AF65-F5344CB8AC3E}">
-        <p14:creationId xmlns:p14="http://schemas.microsoft.com/office/powerpoint/2010/main" val="75369614"/>
+        <p14:creationId xmlns:p14="http://schemas.microsoft.com/office/powerpoint/2010/main" xmlns="" val="75369614"/>
       </p:ext>
     </p:extLst>
   </p:cSld>
@@ -1301,7 +1301,7 @@
             <a:fld id="{7B9B12EC-6AA0-374B-A2D3-850081A07A26}" type="datetimeFigureOut">
               <a:rPr kumimoji="1" lang="ja-JP" altLang="en-US" smtClean="0"/>
               <a:pPr/>
-              <a:t>2014/3/27</a:t>
+              <a:t>2014/10/2</a:t>
             </a:fld>
             <a:endParaRPr kumimoji="1" lang="ja-JP" altLang="en-US" dirty="0"/>
           </a:p>
@@ -1344,7 +1344,7 @@
             <a:fld id="{767EF739-006C-E447-A3B9-2B495A864FAC}" type="slidenum">
               <a:rPr kumimoji="1" lang="ja-JP" altLang="en-US" smtClean="0"/>
               <a:pPr/>
-              <a:t>‹#›</a:t>
+              <a:t>&lt;#&gt;</a:t>
             </a:fld>
             <a:endParaRPr kumimoji="1" lang="ja-JP" altLang="en-US" dirty="0"/>
           </a:p>
@@ -1353,7 +1353,7 @@
     </p:spTree>
     <p:extLst>
       <p:ext uri="{BB962C8B-B14F-4D97-AF65-F5344CB8AC3E}">
-        <p14:creationId xmlns:p14="http://schemas.microsoft.com/office/powerpoint/2010/main" val="956610528"/>
+        <p14:creationId xmlns:p14="http://schemas.microsoft.com/office/powerpoint/2010/main" xmlns="" val="956610528"/>
       </p:ext>
     </p:extLst>
   </p:cSld>
@@ -1549,7 +1549,7 @@
             <a:fld id="{7B9B12EC-6AA0-374B-A2D3-850081A07A26}" type="datetimeFigureOut">
               <a:rPr kumimoji="1" lang="ja-JP" altLang="en-US" smtClean="0"/>
               <a:pPr/>
-              <a:t>2014/3/27</a:t>
+              <a:t>2014/10/2</a:t>
             </a:fld>
             <a:endParaRPr kumimoji="1" lang="ja-JP" altLang="en-US" dirty="0"/>
           </a:p>
@@ -1592,7 +1592,7 @@
             <a:fld id="{767EF739-006C-E447-A3B9-2B495A864FAC}" type="slidenum">
               <a:rPr kumimoji="1" lang="ja-JP" altLang="en-US" smtClean="0"/>
               <a:pPr/>
-              <a:t>‹#›</a:t>
+              <a:t>&lt;#&gt;</a:t>
             </a:fld>
             <a:endParaRPr kumimoji="1" lang="ja-JP" altLang="en-US" dirty="0"/>
           </a:p>
@@ -1601,7 +1601,7 @@
     </p:spTree>
     <p:extLst>
       <p:ext uri="{BB962C8B-B14F-4D97-AF65-F5344CB8AC3E}">
-        <p14:creationId xmlns:p14="http://schemas.microsoft.com/office/powerpoint/2010/main" val="492095304"/>
+        <p14:creationId xmlns:p14="http://schemas.microsoft.com/office/powerpoint/2010/main" xmlns="" val="492095304"/>
       </p:ext>
     </p:extLst>
   </p:cSld>
@@ -1903,7 +1903,7 @@
             <a:fld id="{7B9B12EC-6AA0-374B-A2D3-850081A07A26}" type="datetimeFigureOut">
               <a:rPr kumimoji="1" lang="ja-JP" altLang="en-US" smtClean="0"/>
               <a:pPr/>
-              <a:t>2014/3/27</a:t>
+              <a:t>2014/10/2</a:t>
             </a:fld>
             <a:endParaRPr kumimoji="1" lang="ja-JP" altLang="en-US" dirty="0"/>
           </a:p>
@@ -1946,7 +1946,7 @@
             <a:fld id="{767EF739-006C-E447-A3B9-2B495A864FAC}" type="slidenum">
               <a:rPr kumimoji="1" lang="ja-JP" altLang="en-US" smtClean="0"/>
               <a:pPr/>
-              <a:t>‹#›</a:t>
+              <a:t>&lt;#&gt;</a:t>
             </a:fld>
             <a:endParaRPr kumimoji="1" lang="ja-JP" altLang="en-US" dirty="0"/>
           </a:p>
@@ -1955,7 +1955,7 @@
     </p:spTree>
     <p:extLst>
       <p:ext uri="{BB962C8B-B14F-4D97-AF65-F5344CB8AC3E}">
-        <p14:creationId xmlns:p14="http://schemas.microsoft.com/office/powerpoint/2010/main" val="1557712202"/>
+        <p14:creationId xmlns:p14="http://schemas.microsoft.com/office/powerpoint/2010/main" xmlns="" val="1557712202"/>
       </p:ext>
     </p:extLst>
   </p:cSld>
@@ -2391,7 +2391,7 @@
             <a:fld id="{7B9B12EC-6AA0-374B-A2D3-850081A07A26}" type="datetimeFigureOut">
               <a:rPr kumimoji="1" lang="ja-JP" altLang="en-US" smtClean="0"/>
               <a:pPr/>
-              <a:t>2014/3/27</a:t>
+              <a:t>2014/10/2</a:t>
             </a:fld>
             <a:endParaRPr kumimoji="1" lang="ja-JP" altLang="en-US" dirty="0"/>
           </a:p>
@@ -2434,7 +2434,7 @@
             <a:fld id="{767EF739-006C-E447-A3B9-2B495A864FAC}" type="slidenum">
               <a:rPr kumimoji="1" lang="ja-JP" altLang="en-US" smtClean="0"/>
               <a:pPr/>
-              <a:t>‹#›</a:t>
+              <a:t>&lt;#&gt;</a:t>
             </a:fld>
             <a:endParaRPr kumimoji="1" lang="ja-JP" altLang="en-US" dirty="0"/>
           </a:p>
@@ -2443,7 +2443,7 @@
     </p:spTree>
     <p:extLst>
       <p:ext uri="{BB962C8B-B14F-4D97-AF65-F5344CB8AC3E}">
-        <p14:creationId xmlns:p14="http://schemas.microsoft.com/office/powerpoint/2010/main" val="638338655"/>
+        <p14:creationId xmlns:p14="http://schemas.microsoft.com/office/powerpoint/2010/main" xmlns="" val="638338655"/>
       </p:ext>
     </p:extLst>
   </p:cSld>
@@ -2511,7 +2511,7 @@
             <a:fld id="{7B9B12EC-6AA0-374B-A2D3-850081A07A26}" type="datetimeFigureOut">
               <a:rPr kumimoji="1" lang="ja-JP" altLang="en-US" smtClean="0"/>
               <a:pPr/>
-              <a:t>2014/3/27</a:t>
+              <a:t>2014/10/2</a:t>
             </a:fld>
             <a:endParaRPr kumimoji="1" lang="ja-JP" altLang="en-US" dirty="0"/>
           </a:p>
@@ -2554,7 +2554,7 @@
             <a:fld id="{767EF739-006C-E447-A3B9-2B495A864FAC}" type="slidenum">
               <a:rPr kumimoji="1" lang="ja-JP" altLang="en-US" smtClean="0"/>
               <a:pPr/>
-              <a:t>‹#›</a:t>
+              <a:t>&lt;#&gt;</a:t>
             </a:fld>
             <a:endParaRPr kumimoji="1" lang="ja-JP" altLang="en-US" dirty="0"/>
           </a:p>
@@ -2563,7 +2563,7 @@
     </p:spTree>
     <p:extLst>
       <p:ext uri="{BB962C8B-B14F-4D97-AF65-F5344CB8AC3E}">
-        <p14:creationId xmlns:p14="http://schemas.microsoft.com/office/powerpoint/2010/main" val="2063778013"/>
+        <p14:creationId xmlns:p14="http://schemas.microsoft.com/office/powerpoint/2010/main" xmlns="" val="2063778013"/>
       </p:ext>
     </p:extLst>
   </p:cSld>
@@ -2608,7 +2608,7 @@
             <a:fld id="{7B9B12EC-6AA0-374B-A2D3-850081A07A26}" type="datetimeFigureOut">
               <a:rPr kumimoji="1" lang="ja-JP" altLang="en-US" smtClean="0"/>
               <a:pPr/>
-              <a:t>2014/3/27</a:t>
+              <a:t>2014/10/2</a:t>
             </a:fld>
             <a:endParaRPr kumimoji="1" lang="ja-JP" altLang="en-US" dirty="0"/>
           </a:p>
@@ -2651,7 +2651,7 @@
             <a:fld id="{767EF739-006C-E447-A3B9-2B495A864FAC}" type="slidenum">
               <a:rPr kumimoji="1" lang="ja-JP" altLang="en-US" smtClean="0"/>
               <a:pPr/>
-              <a:t>‹#›</a:t>
+              <a:t>&lt;#&gt;</a:t>
             </a:fld>
             <a:endParaRPr kumimoji="1" lang="ja-JP" altLang="en-US" dirty="0"/>
           </a:p>
@@ -2660,7 +2660,7 @@
     </p:spTree>
     <p:extLst>
       <p:ext uri="{BB962C8B-B14F-4D97-AF65-F5344CB8AC3E}">
-        <p14:creationId xmlns:p14="http://schemas.microsoft.com/office/powerpoint/2010/main" val="1575323657"/>
+        <p14:creationId xmlns:p14="http://schemas.microsoft.com/office/powerpoint/2010/main" xmlns="" val="1575323657"/>
       </p:ext>
     </p:extLst>
   </p:cSld>
@@ -2919,7 +2919,7 @@
             <a:fld id="{7B9B12EC-6AA0-374B-A2D3-850081A07A26}" type="datetimeFigureOut">
               <a:rPr kumimoji="1" lang="ja-JP" altLang="en-US" smtClean="0"/>
               <a:pPr/>
-              <a:t>2014/3/27</a:t>
+              <a:t>2014/10/2</a:t>
             </a:fld>
             <a:endParaRPr kumimoji="1" lang="ja-JP" altLang="en-US" dirty="0"/>
           </a:p>
@@ -2962,7 +2962,7 @@
             <a:fld id="{767EF739-006C-E447-A3B9-2B495A864FAC}" type="slidenum">
               <a:rPr kumimoji="1" lang="ja-JP" altLang="en-US" smtClean="0"/>
               <a:pPr/>
-              <a:t>‹#›</a:t>
+              <a:t>&lt;#&gt;</a:t>
             </a:fld>
             <a:endParaRPr kumimoji="1" lang="ja-JP" altLang="en-US" dirty="0"/>
           </a:p>
@@ -2971,7 +2971,7 @@
     </p:spTree>
     <p:extLst>
       <p:ext uri="{BB962C8B-B14F-4D97-AF65-F5344CB8AC3E}">
-        <p14:creationId xmlns:p14="http://schemas.microsoft.com/office/powerpoint/2010/main" val="3549694789"/>
+        <p14:creationId xmlns:p14="http://schemas.microsoft.com/office/powerpoint/2010/main" xmlns="" val="3549694789"/>
       </p:ext>
     </p:extLst>
   </p:cSld>
@@ -3174,7 +3174,7 @@
             <a:fld id="{7B9B12EC-6AA0-374B-A2D3-850081A07A26}" type="datetimeFigureOut">
               <a:rPr kumimoji="1" lang="ja-JP" altLang="en-US" smtClean="0"/>
               <a:pPr/>
-              <a:t>2014/3/27</a:t>
+              <a:t>2014/10/2</a:t>
             </a:fld>
             <a:endParaRPr kumimoji="1" lang="ja-JP" altLang="en-US" dirty="0"/>
           </a:p>
@@ -3217,7 +3217,7 @@
             <a:fld id="{767EF739-006C-E447-A3B9-2B495A864FAC}" type="slidenum">
               <a:rPr kumimoji="1" lang="ja-JP" altLang="en-US" smtClean="0"/>
               <a:pPr/>
-              <a:t>‹#›</a:t>
+              <a:t>&lt;#&gt;</a:t>
             </a:fld>
             <a:endParaRPr kumimoji="1" lang="ja-JP" altLang="en-US" dirty="0"/>
           </a:p>
@@ -3226,7 +3226,7 @@
     </p:spTree>
     <p:extLst>
       <p:ext uri="{BB962C8B-B14F-4D97-AF65-F5344CB8AC3E}">
-        <p14:creationId xmlns:p14="http://schemas.microsoft.com/office/powerpoint/2010/main" val="2928006269"/>
+        <p14:creationId xmlns:p14="http://schemas.microsoft.com/office/powerpoint/2010/main" xmlns="" val="2928006269"/>
       </p:ext>
     </p:extLst>
   </p:cSld>
@@ -3421,7 +3421,7 @@
             <a:fld id="{7B9B12EC-6AA0-374B-A2D3-850081A07A26}" type="datetimeFigureOut">
               <a:rPr kumimoji="1" lang="ja-JP" altLang="en-US" smtClean="0"/>
               <a:pPr/>
-              <a:t>2014/3/27</a:t>
+              <a:t>2014/10/2</a:t>
             </a:fld>
             <a:endParaRPr kumimoji="1" lang="ja-JP" altLang="en-US" dirty="0"/>
           </a:p>
@@ -3500,7 +3500,7 @@
             <a:fld id="{767EF739-006C-E447-A3B9-2B495A864FAC}" type="slidenum">
               <a:rPr kumimoji="1" lang="ja-JP" altLang="en-US" smtClean="0"/>
               <a:pPr/>
-              <a:t>‹#›</a:t>
+              <a:t>&lt;#&gt;</a:t>
             </a:fld>
             <a:endParaRPr kumimoji="1" lang="ja-JP" altLang="en-US" dirty="0"/>
           </a:p>
@@ -3509,7 +3509,7 @@
     </p:spTree>
     <p:extLst>
       <p:ext uri="{BB962C8B-B14F-4D97-AF65-F5344CB8AC3E}">
-        <p14:creationId xmlns:p14="http://schemas.microsoft.com/office/powerpoint/2010/main" val="1919167372"/>
+        <p14:creationId xmlns:p14="http://schemas.microsoft.com/office/powerpoint/2010/main" xmlns="" val="1919167372"/>
       </p:ext>
     </p:extLst>
   </p:cSld>
@@ -7459,15 +7459,7 @@
                   <a:schemeClr val="tx1"/>
                 </a:solidFill>
               </a:rPr>
-              <a:t>&lt;/</a:t>
-            </a:r>
-            <a:r>
-              <a:rPr lang="en-US" sz="1200" b="1" dirty="0" smtClean="0">
-                <a:solidFill>
-                  <a:schemeClr val="tx1"/>
-                </a:solidFill>
-              </a:rPr>
-              <a:t>bean&gt;</a:t>
+              <a:t>&lt;/bean&gt;</a:t>
             </a:r>
           </a:p>
         </p:txBody>
@@ -10038,7 +10030,23 @@
                   <a:schemeClr val="tx1"/>
                 </a:solidFill>
               </a:rPr>
-              <a:t>"10000" value="Less than $10,000" /&gt;</a:t>
+              <a:t>"10000" value="Less than </a:t>
+            </a:r>
+            <a:r>
+              <a:rPr lang="en-US" altLang="ja-JP" sz="1000" b="1" i="1" dirty="0" smtClean="0">
+                <a:solidFill>
+                  <a:schemeClr val="tx1"/>
+                </a:solidFill>
+              </a:rPr>
+              <a:t>\10,000</a:t>
+            </a:r>
+            <a:r>
+              <a:rPr lang="en-US" altLang="ja-JP" sz="1000" b="1" i="1" dirty="0" smtClean="0">
+                <a:solidFill>
+                  <a:schemeClr val="tx1"/>
+                </a:solidFill>
+              </a:rPr>
+              <a:t>" /&gt;</a:t>
             </a:r>
           </a:p>
           <a:p>
@@ -11054,7 +11062,23 @@
                   <a:schemeClr val="tx1"/>
                 </a:solidFill>
               </a:rPr>
-              <a:t>        &lt;option value="10000"&gt;Less than $10,000&lt;/option&gt;</a:t>
+              <a:t>        &lt;option value="10000"&gt;Less than </a:t>
+            </a:r>
+            <a:r>
+              <a:rPr lang="en-US" sz="1000" b="1" dirty="0" smtClean="0">
+                <a:solidFill>
+                  <a:schemeClr val="tx1"/>
+                </a:solidFill>
+              </a:rPr>
+              <a:t>\10,000</a:t>
+            </a:r>
+            <a:r>
+              <a:rPr lang="en-US" sz="1000" b="1" dirty="0" smtClean="0">
+                <a:solidFill>
+                  <a:schemeClr val="tx1"/>
+                </a:solidFill>
+              </a:rPr>
+              <a:t>&lt;/option&gt;</a:t>
             </a:r>
           </a:p>
           <a:p>
@@ -11421,9 +11445,101 @@
           </a:fontRef>
         </p:style>
       </p:cxnSp>
+      <p:cxnSp>
+        <p:nvCxnSpPr>
+          <p:cNvPr id="68" name="直線矢印コネクタ 67"/>
+          <p:cNvCxnSpPr>
+            <a:stCxn id="38" idx="3"/>
+          </p:cNvCxnSpPr>
+          <p:nvPr/>
+        </p:nvCxnSpPr>
+        <p:spPr>
+          <a:xfrm>
+            <a:off x="5857875" y="5099662"/>
+            <a:ext cx="1562100" cy="0"/>
+          </a:xfrm>
+          <a:prstGeom prst="straightConnector1">
+            <a:avLst/>
+          </a:prstGeom>
+          <a:ln>
+            <a:tailEnd type="arrow"/>
+          </a:ln>
+        </p:spPr>
+        <p:style>
+          <a:lnRef idx="2">
+            <a:schemeClr val="accent1"/>
+          </a:lnRef>
+          <a:fillRef idx="0">
+            <a:schemeClr val="accent1"/>
+          </a:fillRef>
+          <a:effectRef idx="1">
+            <a:schemeClr val="accent1"/>
+          </a:effectRef>
+          <a:fontRef idx="minor">
+            <a:schemeClr val="tx1"/>
+          </a:fontRef>
+        </p:style>
+      </p:cxnSp>
+      <p:sp>
+        <p:nvSpPr>
+          <p:cNvPr id="70" name="正方形/長方形 69"/>
+          <p:cNvSpPr/>
+          <p:nvPr/>
+        </p:nvSpPr>
+        <p:spPr>
+          <a:xfrm>
+            <a:off x="6582898" y="4528162"/>
+            <a:ext cx="2085977" cy="182562"/>
+          </a:xfrm>
+          <a:prstGeom prst="rect">
+            <a:avLst/>
+          </a:prstGeom>
+          <a:noFill/>
+          <a:ln>
+            <a:noFill/>
+          </a:ln>
+          <a:effectLst/>
+        </p:spPr>
+        <p:style>
+          <a:lnRef idx="1">
+            <a:schemeClr val="accent1"/>
+          </a:lnRef>
+          <a:fillRef idx="3">
+            <a:schemeClr val="accent1"/>
+          </a:fillRef>
+          <a:effectRef idx="2">
+            <a:schemeClr val="accent1"/>
+          </a:effectRef>
+          <a:fontRef idx="minor">
+            <a:schemeClr val="lt1"/>
+          </a:fontRef>
+        </p:style>
+        <p:txBody>
+          <a:bodyPr rtlCol="0" anchor="ctr"/>
+          <a:lstStyle/>
+          <a:p>
+            <a:r>
+              <a:rPr lang="en-US" altLang="ja-JP" sz="1200" b="1" dirty="0" smtClean="0">
+                <a:solidFill>
+                  <a:schemeClr val="tx1"/>
+                </a:solidFill>
+              </a:rPr>
+              <a:t>Browser</a:t>
+            </a:r>
+            <a:endParaRPr kumimoji="1" lang="ja-JP" altLang="en-US" sz="1200" dirty="0">
+              <a:solidFill>
+                <a:schemeClr val="accent2">
+                  <a:lumMod val="60000"/>
+                  <a:lumOff val="40000"/>
+                </a:schemeClr>
+              </a:solidFill>
+            </a:endParaRPr>
+          </a:p>
+        </p:txBody>
+      </p:sp>
       <p:pic>
         <p:nvPicPr>
-          <p:cNvPr id="1026" name="Picture 2"/>
+          <p:cNvPr id="1027" name="Picture 3"/>
           <p:cNvPicPr>
             <a:picLocks noChangeAspect="1" noChangeArrowheads="1"/>
           </p:cNvPicPr>
@@ -11438,8 +11554,8 @@
         </p:blipFill>
         <p:spPr bwMode="auto">
           <a:xfrm>
-            <a:off x="7419975" y="4528162"/>
-            <a:ext cx="1285875" cy="1143000"/>
+            <a:off x="7419975" y="5678179"/>
+            <a:ext cx="1009650" cy="1143000"/>
           </a:xfrm>
           <a:prstGeom prst="rect">
             <a:avLst/>
@@ -11453,51 +11569,15 @@
           </a:ln>
         </p:spPr>
       </p:pic>
-      <p:cxnSp>
-        <p:nvCxnSpPr>
-          <p:cNvPr id="68" name="直線矢印コネクタ 67"/>
-          <p:cNvCxnSpPr>
-            <a:stCxn id="38" idx="3"/>
-            <a:endCxn id="1026" idx="1"/>
-          </p:cNvCxnSpPr>
-          <p:nvPr/>
-        </p:nvCxnSpPr>
+      <p:sp>
+        <p:nvSpPr>
+          <p:cNvPr id="72" name="正方形/長方形 71"/>
+          <p:cNvSpPr/>
+          <p:nvPr/>
+        </p:nvSpPr>
         <p:spPr>
           <a:xfrm>
-            <a:off x="5857875" y="5099662"/>
-            <a:ext cx="1562100" cy="0"/>
-          </a:xfrm>
-          <a:prstGeom prst="straightConnector1">
-            <a:avLst/>
-          </a:prstGeom>
-          <a:ln>
-            <a:tailEnd type="arrow"/>
-          </a:ln>
-        </p:spPr>
-        <p:style>
-          <a:lnRef idx="2">
-            <a:schemeClr val="accent1"/>
-          </a:lnRef>
-          <a:fillRef idx="0">
-            <a:schemeClr val="accent1"/>
-          </a:fillRef>
-          <a:effectRef idx="1">
-            <a:schemeClr val="accent1"/>
-          </a:effectRef>
-          <a:fontRef idx="minor">
-            <a:schemeClr val="tx1"/>
-          </a:fontRef>
-        </p:style>
-      </p:cxnSp>
-      <p:sp>
-        <p:nvSpPr>
-          <p:cNvPr id="70" name="正方形/長方形 69"/>
-          <p:cNvSpPr/>
-          <p:nvPr/>
-        </p:nvSpPr>
-        <p:spPr>
-          <a:xfrm>
-            <a:off x="6582898" y="4528162"/>
+            <a:off x="6644262" y="5678179"/>
             <a:ext cx="2085977" cy="182562"/>
           </a:xfrm>
           <a:prstGeom prst="rect">
@@ -11546,9 +11626,215 @@
           </a:p>
         </p:txBody>
       </p:sp>
+      <p:cxnSp>
+        <p:nvCxnSpPr>
+          <p:cNvPr id="73" name="直線矢印コネクタ 72"/>
+          <p:cNvCxnSpPr>
+            <a:stCxn id="45" idx="3"/>
+          </p:cNvCxnSpPr>
+          <p:nvPr/>
+        </p:nvCxnSpPr>
+        <p:spPr>
+          <a:xfrm>
+            <a:off x="5857875" y="6309337"/>
+            <a:ext cx="1562100" cy="0"/>
+          </a:xfrm>
+          <a:prstGeom prst="straightConnector1">
+            <a:avLst/>
+          </a:prstGeom>
+          <a:ln>
+            <a:tailEnd type="arrow"/>
+          </a:ln>
+        </p:spPr>
+        <p:style>
+          <a:lnRef idx="2">
+            <a:schemeClr val="accent1"/>
+          </a:lnRef>
+          <a:fillRef idx="0">
+            <a:schemeClr val="accent1"/>
+          </a:fillRef>
+          <a:effectRef idx="1">
+            <a:schemeClr val="accent1"/>
+          </a:effectRef>
+          <a:fontRef idx="minor">
+            <a:schemeClr val="tx1"/>
+          </a:fontRef>
+        </p:style>
+      </p:cxnSp>
+      <p:cxnSp>
+        <p:nvCxnSpPr>
+          <p:cNvPr id="78" name="直線矢印コネクタ 77"/>
+          <p:cNvCxnSpPr>
+            <a:stCxn id="11" idx="3"/>
+          </p:cNvCxnSpPr>
+          <p:nvPr/>
+        </p:nvCxnSpPr>
+        <p:spPr>
+          <a:xfrm>
+            <a:off x="3120012" y="3446789"/>
+            <a:ext cx="962024" cy="0"/>
+          </a:xfrm>
+          <a:prstGeom prst="straightConnector1">
+            <a:avLst/>
+          </a:prstGeom>
+          <a:ln>
+            <a:solidFill>
+              <a:srgbClr val="00B050"/>
+            </a:solidFill>
+            <a:tailEnd type="arrow"/>
+          </a:ln>
+        </p:spPr>
+        <p:style>
+          <a:lnRef idx="2">
+            <a:schemeClr val="accent1"/>
+          </a:lnRef>
+          <a:fillRef idx="0">
+            <a:schemeClr val="accent1"/>
+          </a:fillRef>
+          <a:effectRef idx="1">
+            <a:schemeClr val="accent1"/>
+          </a:effectRef>
+          <a:fontRef idx="minor">
+            <a:schemeClr val="tx1"/>
+          </a:fontRef>
+        </p:style>
+      </p:cxnSp>
+      <p:sp>
+        <p:nvSpPr>
+          <p:cNvPr id="86" name="正方形/長方形 85"/>
+          <p:cNvSpPr/>
+          <p:nvPr/>
+        </p:nvSpPr>
+        <p:spPr>
+          <a:xfrm>
+            <a:off x="764668" y="1671329"/>
+            <a:ext cx="5879594" cy="738496"/>
+          </a:xfrm>
+          <a:prstGeom prst="rect">
+            <a:avLst/>
+          </a:prstGeom>
+          <a:noFill/>
+          <a:ln w="31750">
+            <a:solidFill>
+              <a:srgbClr val="FFC000"/>
+            </a:solidFill>
+            <a:prstDash val="sysDash"/>
+          </a:ln>
+        </p:spPr>
+        <p:style>
+          <a:lnRef idx="1">
+            <a:schemeClr val="accent1"/>
+          </a:lnRef>
+          <a:fillRef idx="3">
+            <a:schemeClr val="accent1"/>
+          </a:fillRef>
+          <a:effectRef idx="2">
+            <a:schemeClr val="accent1"/>
+          </a:effectRef>
+          <a:fontRef idx="minor">
+            <a:schemeClr val="lt1"/>
+          </a:fontRef>
+        </p:style>
+        <p:txBody>
+          <a:bodyPr rtlCol="0" anchor="ctr"/>
+          <a:lstStyle/>
+          <a:p>
+            <a:pPr algn="ctr"/>
+            <a:endParaRPr kumimoji="1" lang="ja-JP" altLang="en-US" dirty="0"/>
+          </a:p>
+        </p:txBody>
+      </p:sp>
+      <p:sp>
+        <p:nvSpPr>
+          <p:cNvPr id="89" name="正方形/長方形 88"/>
+          <p:cNvSpPr/>
+          <p:nvPr/>
+        </p:nvSpPr>
+        <p:spPr>
+          <a:xfrm>
+            <a:off x="557786" y="3576329"/>
+            <a:ext cx="2562226" cy="188595"/>
+          </a:xfrm>
+          <a:prstGeom prst="rect">
+            <a:avLst/>
+          </a:prstGeom>
+          <a:noFill/>
+          <a:ln w="31750">
+            <a:solidFill>
+              <a:srgbClr val="FFC000"/>
+            </a:solidFill>
+            <a:prstDash val="sysDash"/>
+          </a:ln>
+        </p:spPr>
+        <p:style>
+          <a:lnRef idx="1">
+            <a:schemeClr val="accent1"/>
+          </a:lnRef>
+          <a:fillRef idx="3">
+            <a:schemeClr val="accent1"/>
+          </a:fillRef>
+          <a:effectRef idx="2">
+            <a:schemeClr val="accent1"/>
+          </a:effectRef>
+          <a:fontRef idx="minor">
+            <a:schemeClr val="lt1"/>
+          </a:fontRef>
+        </p:style>
+        <p:txBody>
+          <a:bodyPr rtlCol="0" anchor="ctr"/>
+          <a:lstStyle/>
+          <a:p>
+            <a:pPr algn="ctr"/>
+            <a:endParaRPr kumimoji="1" lang="ja-JP" altLang="en-US" dirty="0"/>
+          </a:p>
+        </p:txBody>
+      </p:sp>
+      <p:cxnSp>
+        <p:nvCxnSpPr>
+          <p:cNvPr id="91" name="図形 90"/>
+          <p:cNvCxnSpPr>
+            <a:stCxn id="86" idx="3"/>
+            <a:endCxn id="89" idx="1"/>
+          </p:cNvCxnSpPr>
+          <p:nvPr/>
+        </p:nvCxnSpPr>
+        <p:spPr>
+          <a:xfrm flipH="1">
+            <a:off x="557786" y="2040577"/>
+            <a:ext cx="6086476" cy="1630050"/>
+          </a:xfrm>
+          <a:prstGeom prst="bentConnector5">
+            <a:avLst>
+              <a:gd name="adj1" fmla="val -2035"/>
+              <a:gd name="adj2" fmla="val 32723"/>
+              <a:gd name="adj3" fmla="val 105477"/>
+            </a:avLst>
+          </a:prstGeom>
+          <a:ln>
+            <a:solidFill>
+              <a:srgbClr val="FFC000"/>
+            </a:solidFill>
+            <a:tailEnd type="arrow"/>
+          </a:ln>
+        </p:spPr>
+        <p:style>
+          <a:lnRef idx="2">
+            <a:schemeClr val="accent1"/>
+          </a:lnRef>
+          <a:fillRef idx="0">
+            <a:schemeClr val="accent1"/>
+          </a:fillRef>
+          <a:effectRef idx="1">
+            <a:schemeClr val="accent1"/>
+          </a:effectRef>
+          <a:fontRef idx="minor">
+            <a:schemeClr val="tx1"/>
+          </a:fontRef>
+        </p:style>
+      </p:cxnSp>
       <p:pic>
         <p:nvPicPr>
-          <p:cNvPr id="1027" name="Picture 3"/>
+          <p:cNvPr id="2" name="Picture 2" descr="C:\Users\bttatsutanik.RDH\work_gfw\documents\guideline\source\ArchitectureInDetail\images\codelist_i18n_en.png"/>
           <p:cNvPicPr>
             <a:picLocks noChangeAspect="1" noChangeArrowheads="1"/>
           </p:cNvPicPr>
@@ -11563,284 +11849,15 @@
         </p:blipFill>
         <p:spPr bwMode="auto">
           <a:xfrm>
-            <a:off x="7419975" y="5678179"/>
-            <a:ext cx="1009650" cy="1143000"/>
+            <a:off x="7419975" y="4506063"/>
+            <a:ext cx="1343025" cy="1095375"/>
           </a:xfrm>
           <a:prstGeom prst="rect">
             <a:avLst/>
           </a:prstGeom>
           <a:noFill/>
-          <a:ln w="9525">
-            <a:noFill/>
-            <a:miter lim="800000"/>
-            <a:headEnd/>
-            <a:tailEnd/>
-          </a:ln>
         </p:spPr>
       </p:pic>
-      <p:sp>
-        <p:nvSpPr>
-          <p:cNvPr id="72" name="正方形/長方形 71"/>
-          <p:cNvSpPr/>
-          <p:nvPr/>
-        </p:nvSpPr>
-        <p:spPr>
-          <a:xfrm>
-            <a:off x="6644262" y="5678179"/>
-            <a:ext cx="2085977" cy="182562"/>
-          </a:xfrm>
-          <a:prstGeom prst="rect">
-            <a:avLst/>
-          </a:prstGeom>
-          <a:noFill/>
-          <a:ln>
-            <a:noFill/>
-          </a:ln>
-          <a:effectLst/>
-        </p:spPr>
-        <p:style>
-          <a:lnRef idx="1">
-            <a:schemeClr val="accent1"/>
-          </a:lnRef>
-          <a:fillRef idx="3">
-            <a:schemeClr val="accent1"/>
-          </a:fillRef>
-          <a:effectRef idx="2">
-            <a:schemeClr val="accent1"/>
-          </a:effectRef>
-          <a:fontRef idx="minor">
-            <a:schemeClr val="lt1"/>
-          </a:fontRef>
-        </p:style>
-        <p:txBody>
-          <a:bodyPr rtlCol="0" anchor="ctr"/>
-          <a:lstStyle/>
-          <a:p>
-            <a:r>
-              <a:rPr lang="en-US" altLang="ja-JP" sz="1200" b="1" dirty="0" smtClean="0">
-                <a:solidFill>
-                  <a:schemeClr val="tx1"/>
-                </a:solidFill>
-              </a:rPr>
-              <a:t>Browser</a:t>
-            </a:r>
-            <a:endParaRPr kumimoji="1" lang="ja-JP" altLang="en-US" sz="1200" dirty="0">
-              <a:solidFill>
-                <a:schemeClr val="accent2">
-                  <a:lumMod val="60000"/>
-                  <a:lumOff val="40000"/>
-                </a:schemeClr>
-              </a:solidFill>
-            </a:endParaRPr>
-          </a:p>
-        </p:txBody>
-      </p:sp>
-      <p:cxnSp>
-        <p:nvCxnSpPr>
-          <p:cNvPr id="73" name="直線矢印コネクタ 72"/>
-          <p:cNvCxnSpPr>
-            <a:stCxn id="45" idx="3"/>
-          </p:cNvCxnSpPr>
-          <p:nvPr/>
-        </p:nvCxnSpPr>
-        <p:spPr>
-          <a:xfrm>
-            <a:off x="5857875" y="6309337"/>
-            <a:ext cx="1562100" cy="0"/>
-          </a:xfrm>
-          <a:prstGeom prst="straightConnector1">
-            <a:avLst/>
-          </a:prstGeom>
-          <a:ln>
-            <a:tailEnd type="arrow"/>
-          </a:ln>
-        </p:spPr>
-        <p:style>
-          <a:lnRef idx="2">
-            <a:schemeClr val="accent1"/>
-          </a:lnRef>
-          <a:fillRef idx="0">
-            <a:schemeClr val="accent1"/>
-          </a:fillRef>
-          <a:effectRef idx="1">
-            <a:schemeClr val="accent1"/>
-          </a:effectRef>
-          <a:fontRef idx="minor">
-            <a:schemeClr val="tx1"/>
-          </a:fontRef>
-        </p:style>
-      </p:cxnSp>
-      <p:cxnSp>
-        <p:nvCxnSpPr>
-          <p:cNvPr id="78" name="直線矢印コネクタ 77"/>
-          <p:cNvCxnSpPr>
-            <a:stCxn id="11" idx="3"/>
-          </p:cNvCxnSpPr>
-          <p:nvPr/>
-        </p:nvCxnSpPr>
-        <p:spPr>
-          <a:xfrm>
-            <a:off x="3120012" y="3446789"/>
-            <a:ext cx="962024" cy="0"/>
-          </a:xfrm>
-          <a:prstGeom prst="straightConnector1">
-            <a:avLst/>
-          </a:prstGeom>
-          <a:ln>
-            <a:solidFill>
-              <a:srgbClr val="00B050"/>
-            </a:solidFill>
-            <a:tailEnd type="arrow"/>
-          </a:ln>
-        </p:spPr>
-        <p:style>
-          <a:lnRef idx="2">
-            <a:schemeClr val="accent1"/>
-          </a:lnRef>
-          <a:fillRef idx="0">
-            <a:schemeClr val="accent1"/>
-          </a:fillRef>
-          <a:effectRef idx="1">
-            <a:schemeClr val="accent1"/>
-          </a:effectRef>
-          <a:fontRef idx="minor">
-            <a:schemeClr val="tx1"/>
-          </a:fontRef>
-        </p:style>
-      </p:cxnSp>
-      <p:sp>
-        <p:nvSpPr>
-          <p:cNvPr id="86" name="正方形/長方形 85"/>
-          <p:cNvSpPr/>
-          <p:nvPr/>
-        </p:nvSpPr>
-        <p:spPr>
-          <a:xfrm>
-            <a:off x="764668" y="1671329"/>
-            <a:ext cx="5879594" cy="738496"/>
-          </a:xfrm>
-          <a:prstGeom prst="rect">
-            <a:avLst/>
-          </a:prstGeom>
-          <a:noFill/>
-          <a:ln w="31750">
-            <a:solidFill>
-              <a:srgbClr val="FFC000"/>
-            </a:solidFill>
-            <a:prstDash val="sysDash"/>
-          </a:ln>
-        </p:spPr>
-        <p:style>
-          <a:lnRef idx="1">
-            <a:schemeClr val="accent1"/>
-          </a:lnRef>
-          <a:fillRef idx="3">
-            <a:schemeClr val="accent1"/>
-          </a:fillRef>
-          <a:effectRef idx="2">
-            <a:schemeClr val="accent1"/>
-          </a:effectRef>
-          <a:fontRef idx="minor">
-            <a:schemeClr val="lt1"/>
-          </a:fontRef>
-        </p:style>
-        <p:txBody>
-          <a:bodyPr rtlCol="0" anchor="ctr"/>
-          <a:lstStyle/>
-          <a:p>
-            <a:pPr algn="ctr"/>
-            <a:endParaRPr kumimoji="1" lang="ja-JP" altLang="en-US" dirty="0"/>
-          </a:p>
-        </p:txBody>
-      </p:sp>
-      <p:sp>
-        <p:nvSpPr>
-          <p:cNvPr id="89" name="正方形/長方形 88"/>
-          <p:cNvSpPr/>
-          <p:nvPr/>
-        </p:nvSpPr>
-        <p:spPr>
-          <a:xfrm>
-            <a:off x="557786" y="3576329"/>
-            <a:ext cx="2562226" cy="188595"/>
-          </a:xfrm>
-          <a:prstGeom prst="rect">
-            <a:avLst/>
-          </a:prstGeom>
-          <a:noFill/>
-          <a:ln w="31750">
-            <a:solidFill>
-              <a:srgbClr val="FFC000"/>
-            </a:solidFill>
-            <a:prstDash val="sysDash"/>
-          </a:ln>
-        </p:spPr>
-        <p:style>
-          <a:lnRef idx="1">
-            <a:schemeClr val="accent1"/>
-          </a:lnRef>
-          <a:fillRef idx="3">
-            <a:schemeClr val="accent1"/>
-          </a:fillRef>
-          <a:effectRef idx="2">
-            <a:schemeClr val="accent1"/>
-          </a:effectRef>
-          <a:fontRef idx="minor">
-            <a:schemeClr val="lt1"/>
-          </a:fontRef>
-        </p:style>
-        <p:txBody>
-          <a:bodyPr rtlCol="0" anchor="ctr"/>
-          <a:lstStyle/>
-          <a:p>
-            <a:pPr algn="ctr"/>
-            <a:endParaRPr kumimoji="1" lang="ja-JP" altLang="en-US" dirty="0"/>
-          </a:p>
-        </p:txBody>
-      </p:sp>
-      <p:cxnSp>
-        <p:nvCxnSpPr>
-          <p:cNvPr id="91" name="図形 90"/>
-          <p:cNvCxnSpPr>
-            <a:stCxn id="86" idx="3"/>
-            <a:endCxn id="89" idx="1"/>
-          </p:cNvCxnSpPr>
-          <p:nvPr/>
-        </p:nvCxnSpPr>
-        <p:spPr>
-          <a:xfrm flipH="1">
-            <a:off x="557786" y="2040577"/>
-            <a:ext cx="6086476" cy="1630050"/>
-          </a:xfrm>
-          <a:prstGeom prst="bentConnector5">
-            <a:avLst>
-              <a:gd name="adj1" fmla="val -2035"/>
-              <a:gd name="adj2" fmla="val 32723"/>
-              <a:gd name="adj3" fmla="val 105477"/>
-            </a:avLst>
-          </a:prstGeom>
-          <a:ln>
-            <a:solidFill>
-              <a:srgbClr val="FFC000"/>
-            </a:solidFill>
-            <a:tailEnd type="arrow"/>
-          </a:ln>
-        </p:spPr>
-        <p:style>
-          <a:lnRef idx="2">
-            <a:schemeClr val="accent1"/>
-          </a:lnRef>
-          <a:fillRef idx="0">
-            <a:schemeClr val="accent1"/>
-          </a:fillRef>
-          <a:effectRef idx="1">
-            <a:schemeClr val="accent1"/>
-          </a:effectRef>
-          <a:fontRef idx="minor">
-            <a:schemeClr val="tx1"/>
-          </a:fontRef>
-        </p:style>
-      </p:cxnSp>
     </p:spTree>
   </p:cSld>
   <p:clrMapOvr>

</xml_diff>

<commit_message>
correct $ -> \ in png #268
</commit_message>
<xml_diff>
--- a/source/ArchitectureInDetail/images_CodeList/materialCodeList.pptx
+++ b/source/ArchitectureInDetail/images_CodeList/materialCodeList.pptx
@@ -397,7 +397,7 @@
     </p:spTree>
     <p:extLst>
       <p:ext uri="{BB962C8B-B14F-4D97-AF65-F5344CB8AC3E}">
-        <p14:creationId xmlns:p14="http://schemas.microsoft.com/office/powerpoint/2010/main" xmlns="" val="1563212060"/>
+        <p14:creationId xmlns="" xmlns:p14="http://schemas.microsoft.com/office/powerpoint/2010/main" val="1563212060"/>
       </p:ext>
     </p:extLst>
   </p:cSld>
@@ -731,7 +731,7 @@
     </p:spTree>
     <p:extLst>
       <p:ext uri="{BB962C8B-B14F-4D97-AF65-F5344CB8AC3E}">
-        <p14:creationId xmlns:p14="http://schemas.microsoft.com/office/powerpoint/2010/main" xmlns="" val="2957268178"/>
+        <p14:creationId xmlns="" xmlns:p14="http://schemas.microsoft.com/office/powerpoint/2010/main" val="2957268178"/>
       </p:ext>
     </p:extLst>
   </p:cSld>
@@ -935,7 +935,7 @@
     </p:spTree>
     <p:extLst>
       <p:ext uri="{BB962C8B-B14F-4D97-AF65-F5344CB8AC3E}">
-        <p14:creationId xmlns:p14="http://schemas.microsoft.com/office/powerpoint/2010/main" xmlns="" val="99248395"/>
+        <p14:creationId xmlns="" xmlns:p14="http://schemas.microsoft.com/office/powerpoint/2010/main" val="99248395"/>
       </p:ext>
     </p:extLst>
   </p:cSld>
@@ -1149,7 +1149,7 @@
     </p:spTree>
     <p:extLst>
       <p:ext uri="{BB962C8B-B14F-4D97-AF65-F5344CB8AC3E}">
-        <p14:creationId xmlns:p14="http://schemas.microsoft.com/office/powerpoint/2010/main" xmlns="" val="75369614"/>
+        <p14:creationId xmlns="" xmlns:p14="http://schemas.microsoft.com/office/powerpoint/2010/main" val="75369614"/>
       </p:ext>
     </p:extLst>
   </p:cSld>
@@ -1353,7 +1353,7 @@
     </p:spTree>
     <p:extLst>
       <p:ext uri="{BB962C8B-B14F-4D97-AF65-F5344CB8AC3E}">
-        <p14:creationId xmlns:p14="http://schemas.microsoft.com/office/powerpoint/2010/main" xmlns="" val="956610528"/>
+        <p14:creationId xmlns="" xmlns:p14="http://schemas.microsoft.com/office/powerpoint/2010/main" val="956610528"/>
       </p:ext>
     </p:extLst>
   </p:cSld>
@@ -1601,7 +1601,7 @@
     </p:spTree>
     <p:extLst>
       <p:ext uri="{BB962C8B-B14F-4D97-AF65-F5344CB8AC3E}">
-        <p14:creationId xmlns:p14="http://schemas.microsoft.com/office/powerpoint/2010/main" xmlns="" val="492095304"/>
+        <p14:creationId xmlns="" xmlns:p14="http://schemas.microsoft.com/office/powerpoint/2010/main" val="492095304"/>
       </p:ext>
     </p:extLst>
   </p:cSld>
@@ -1955,7 +1955,7 @@
     </p:spTree>
     <p:extLst>
       <p:ext uri="{BB962C8B-B14F-4D97-AF65-F5344CB8AC3E}">
-        <p14:creationId xmlns:p14="http://schemas.microsoft.com/office/powerpoint/2010/main" xmlns="" val="1557712202"/>
+        <p14:creationId xmlns="" xmlns:p14="http://schemas.microsoft.com/office/powerpoint/2010/main" val="1557712202"/>
       </p:ext>
     </p:extLst>
   </p:cSld>
@@ -2443,7 +2443,7 @@
     </p:spTree>
     <p:extLst>
       <p:ext uri="{BB962C8B-B14F-4D97-AF65-F5344CB8AC3E}">
-        <p14:creationId xmlns:p14="http://schemas.microsoft.com/office/powerpoint/2010/main" xmlns="" val="638338655"/>
+        <p14:creationId xmlns="" xmlns:p14="http://schemas.microsoft.com/office/powerpoint/2010/main" val="638338655"/>
       </p:ext>
     </p:extLst>
   </p:cSld>
@@ -2563,7 +2563,7 @@
     </p:spTree>
     <p:extLst>
       <p:ext uri="{BB962C8B-B14F-4D97-AF65-F5344CB8AC3E}">
-        <p14:creationId xmlns:p14="http://schemas.microsoft.com/office/powerpoint/2010/main" xmlns="" val="2063778013"/>
+        <p14:creationId xmlns="" xmlns:p14="http://schemas.microsoft.com/office/powerpoint/2010/main" val="2063778013"/>
       </p:ext>
     </p:extLst>
   </p:cSld>
@@ -2660,7 +2660,7 @@
     </p:spTree>
     <p:extLst>
       <p:ext uri="{BB962C8B-B14F-4D97-AF65-F5344CB8AC3E}">
-        <p14:creationId xmlns:p14="http://schemas.microsoft.com/office/powerpoint/2010/main" xmlns="" val="1575323657"/>
+        <p14:creationId xmlns="" xmlns:p14="http://schemas.microsoft.com/office/powerpoint/2010/main" val="1575323657"/>
       </p:ext>
     </p:extLst>
   </p:cSld>
@@ -2971,7 +2971,7 @@
     </p:spTree>
     <p:extLst>
       <p:ext uri="{BB962C8B-B14F-4D97-AF65-F5344CB8AC3E}">
-        <p14:creationId xmlns:p14="http://schemas.microsoft.com/office/powerpoint/2010/main" xmlns="" val="3549694789"/>
+        <p14:creationId xmlns="" xmlns:p14="http://schemas.microsoft.com/office/powerpoint/2010/main" val="3549694789"/>
       </p:ext>
     </p:extLst>
   </p:cSld>
@@ -3226,7 +3226,7 @@
     </p:spTree>
     <p:extLst>
       <p:ext uri="{BB962C8B-B14F-4D97-AF65-F5344CB8AC3E}">
-        <p14:creationId xmlns:p14="http://schemas.microsoft.com/office/powerpoint/2010/main" xmlns="" val="2928006269"/>
+        <p14:creationId xmlns="" xmlns:p14="http://schemas.microsoft.com/office/powerpoint/2010/main" val="2928006269"/>
       </p:ext>
     </p:extLst>
   </p:cSld>
@@ -3509,7 +3509,7 @@
     </p:spTree>
     <p:extLst>
       <p:ext uri="{BB962C8B-B14F-4D97-AF65-F5344CB8AC3E}">
-        <p14:creationId xmlns:p14="http://schemas.microsoft.com/office/powerpoint/2010/main" xmlns="" val="1919167372"/>
+        <p14:creationId xmlns="" xmlns:p14="http://schemas.microsoft.com/office/powerpoint/2010/main" val="1919167372"/>
       </p:ext>
     </p:extLst>
   </p:cSld>
@@ -10030,23 +10030,7 @@
                   <a:schemeClr val="tx1"/>
                 </a:solidFill>
               </a:rPr>
-              <a:t>"10000" value="Less than </a:t>
-            </a:r>
-            <a:r>
-              <a:rPr lang="en-US" altLang="ja-JP" sz="1000" b="1" i="1" dirty="0" smtClean="0">
-                <a:solidFill>
-                  <a:schemeClr val="tx1"/>
-                </a:solidFill>
-              </a:rPr>
-              <a:t>\10,000</a:t>
-            </a:r>
-            <a:r>
-              <a:rPr lang="en-US" altLang="ja-JP" sz="1000" b="1" i="1" dirty="0" smtClean="0">
-                <a:solidFill>
-                  <a:schemeClr val="tx1"/>
-                </a:solidFill>
-              </a:rPr>
-              <a:t>" /&gt;</a:t>
+              <a:t>"10000" value="Less than \10,000" /&gt;</a:t>
             </a:r>
           </a:p>
           <a:p>
@@ -10637,7 +10621,23 @@
                             <a:schemeClr val="tx1"/>
                           </a:solidFill>
                         </a:rPr>
-                        <a:t>Less than $10,000</a:t>
+                        <a:t>Less </a:t>
+                      </a:r>
+                      <a:r>
+                        <a:rPr lang="en-US" altLang="ja-JP" sz="800" i="1" smtClean="0">
+                          <a:solidFill>
+                            <a:schemeClr val="tx1"/>
+                          </a:solidFill>
+                        </a:rPr>
+                        <a:t>than </a:t>
+                      </a:r>
+                      <a:r>
+                        <a:rPr lang="en-US" altLang="ja-JP" sz="800" i="1" smtClean="0">
+                          <a:solidFill>
+                            <a:schemeClr val="tx1"/>
+                          </a:solidFill>
+                        </a:rPr>
+                        <a:t>\10,000</a:t>
                       </a:r>
                       <a:endParaRPr kumimoji="1" lang="ja-JP" altLang="en-US" sz="800" dirty="0"/>
                     </a:p>
@@ -11062,23 +11062,7 @@
                   <a:schemeClr val="tx1"/>
                 </a:solidFill>
               </a:rPr>
-              <a:t>        &lt;option value="10000"&gt;Less than </a:t>
-            </a:r>
-            <a:r>
-              <a:rPr lang="en-US" sz="1000" b="1" dirty="0" smtClean="0">
-                <a:solidFill>
-                  <a:schemeClr val="tx1"/>
-                </a:solidFill>
-              </a:rPr>
-              <a:t>\10,000</a:t>
-            </a:r>
-            <a:r>
-              <a:rPr lang="en-US" sz="1000" b="1" dirty="0" smtClean="0">
-                <a:solidFill>
-                  <a:schemeClr val="tx1"/>
-                </a:solidFill>
-              </a:rPr>
-              <a:t>&lt;/option&gt;</a:t>
+              <a:t>        &lt;option value="10000"&gt;Less than \10,000&lt;/option&gt;</a:t>
             </a:r>
           </a:p>
           <a:p>

</xml_diff>

<commit_message>
Added description about EnumCodeList. #56
</commit_message>
<xml_diff>
--- a/source/ArchitectureInDetail/images_CodeList/materialCodeList.pptx
+++ b/source/ArchitectureInDetail/images_CodeList/materialCodeList.pptx
@@ -5,13 +5,14 @@
     <p:sldMasterId id="2147483648" r:id="rId1"/>
   </p:sldMasterIdLst>
   <p:notesMasterIdLst>
-    <p:notesMasterId r:id="rId6"/>
+    <p:notesMasterId r:id="rId7"/>
   </p:notesMasterIdLst>
   <p:sldIdLst>
     <p:sldId id="283" r:id="rId2"/>
     <p:sldId id="284" r:id="rId3"/>
-    <p:sldId id="285" r:id="rId4"/>
-    <p:sldId id="311" r:id="rId5"/>
+    <p:sldId id="312" r:id="rId4"/>
+    <p:sldId id="285" r:id="rId5"/>
+    <p:sldId id="311" r:id="rId6"/>
   </p:sldIdLst>
   <p:sldSz cx="9144000" cy="6858000" type="screen4x3"/>
   <p:notesSz cx="6858000" cy="9144000"/>
@@ -196,7 +197,7 @@
             <a:fld id="{3BB47352-BF5A-4CD2-B029-996118CD8E01}" type="datetimeFigureOut">
               <a:rPr kumimoji="1" lang="ja-JP" altLang="en-US" smtClean="0"/>
               <a:pPr/>
-              <a:t>2014/10/2</a:t>
+              <a:t>2014/12/17</a:t>
             </a:fld>
             <a:endParaRPr kumimoji="1" lang="ja-JP" altLang="en-US" dirty="0"/>
           </a:p>
@@ -388,7 +389,7 @@
             <a:fld id="{003CFFA3-9D07-4088-826B-DF328166082C}" type="slidenum">
               <a:rPr kumimoji="1" lang="ja-JP" altLang="en-US" smtClean="0"/>
               <a:pPr/>
-              <a:t>&lt;#&gt;</a:t>
+              <a:t>‹#›</a:t>
             </a:fld>
             <a:endParaRPr kumimoji="1" lang="ja-JP" altLang="en-US" dirty="0"/>
           </a:p>
@@ -397,7 +398,7 @@
     </p:spTree>
     <p:extLst>
       <p:ext uri="{BB962C8B-B14F-4D97-AF65-F5344CB8AC3E}">
-        <p14:creationId xmlns="" xmlns:p14="http://schemas.microsoft.com/office/powerpoint/2010/main" val="1563212060"/>
+        <p14:creationId xmlns:p14="http://schemas.microsoft.com/office/powerpoint/2010/main" val="1563212060"/>
       </p:ext>
     </p:extLst>
   </p:cSld>
@@ -679,7 +680,7 @@
             <a:fld id="{7B9B12EC-6AA0-374B-A2D3-850081A07A26}" type="datetimeFigureOut">
               <a:rPr kumimoji="1" lang="ja-JP" altLang="en-US" smtClean="0"/>
               <a:pPr/>
-              <a:t>2014/10/2</a:t>
+              <a:t>2014/12/17</a:t>
             </a:fld>
             <a:endParaRPr kumimoji="1" lang="ja-JP" altLang="en-US" dirty="0"/>
           </a:p>
@@ -722,7 +723,7 @@
             <a:fld id="{767EF739-006C-E447-A3B9-2B495A864FAC}" type="slidenum">
               <a:rPr kumimoji="1" lang="ja-JP" altLang="en-US" smtClean="0"/>
               <a:pPr/>
-              <a:t>&lt;#&gt;</a:t>
+              <a:t>‹#›</a:t>
             </a:fld>
             <a:endParaRPr kumimoji="1" lang="ja-JP" altLang="en-US" dirty="0"/>
           </a:p>
@@ -731,7 +732,7 @@
     </p:spTree>
     <p:extLst>
       <p:ext uri="{BB962C8B-B14F-4D97-AF65-F5344CB8AC3E}">
-        <p14:creationId xmlns="" xmlns:p14="http://schemas.microsoft.com/office/powerpoint/2010/main" val="2957268178"/>
+        <p14:creationId xmlns:p14="http://schemas.microsoft.com/office/powerpoint/2010/main" val="2957268178"/>
       </p:ext>
     </p:extLst>
   </p:cSld>
@@ -883,7 +884,7 @@
             <a:fld id="{7B9B12EC-6AA0-374B-A2D3-850081A07A26}" type="datetimeFigureOut">
               <a:rPr kumimoji="1" lang="ja-JP" altLang="en-US" smtClean="0"/>
               <a:pPr/>
-              <a:t>2014/10/2</a:t>
+              <a:t>2014/12/17</a:t>
             </a:fld>
             <a:endParaRPr kumimoji="1" lang="ja-JP" altLang="en-US" dirty="0"/>
           </a:p>
@@ -926,7 +927,7 @@
             <a:fld id="{767EF739-006C-E447-A3B9-2B495A864FAC}" type="slidenum">
               <a:rPr kumimoji="1" lang="ja-JP" altLang="en-US" smtClean="0"/>
               <a:pPr/>
-              <a:t>&lt;#&gt;</a:t>
+              <a:t>‹#›</a:t>
             </a:fld>
             <a:endParaRPr kumimoji="1" lang="ja-JP" altLang="en-US" dirty="0"/>
           </a:p>
@@ -935,7 +936,7 @@
     </p:spTree>
     <p:extLst>
       <p:ext uri="{BB962C8B-B14F-4D97-AF65-F5344CB8AC3E}">
-        <p14:creationId xmlns="" xmlns:p14="http://schemas.microsoft.com/office/powerpoint/2010/main" val="99248395"/>
+        <p14:creationId xmlns:p14="http://schemas.microsoft.com/office/powerpoint/2010/main" val="99248395"/>
       </p:ext>
     </p:extLst>
   </p:cSld>
@@ -1097,7 +1098,7 @@
             <a:fld id="{7B9B12EC-6AA0-374B-A2D3-850081A07A26}" type="datetimeFigureOut">
               <a:rPr kumimoji="1" lang="ja-JP" altLang="en-US" smtClean="0"/>
               <a:pPr/>
-              <a:t>2014/10/2</a:t>
+              <a:t>2014/12/17</a:t>
             </a:fld>
             <a:endParaRPr kumimoji="1" lang="ja-JP" altLang="en-US" dirty="0"/>
           </a:p>
@@ -1140,7 +1141,7 @@
             <a:fld id="{767EF739-006C-E447-A3B9-2B495A864FAC}" type="slidenum">
               <a:rPr kumimoji="1" lang="ja-JP" altLang="en-US" smtClean="0"/>
               <a:pPr/>
-              <a:t>&lt;#&gt;</a:t>
+              <a:t>‹#›</a:t>
             </a:fld>
             <a:endParaRPr kumimoji="1" lang="ja-JP" altLang="en-US" dirty="0"/>
           </a:p>
@@ -1149,7 +1150,7 @@
     </p:spTree>
     <p:extLst>
       <p:ext uri="{BB962C8B-B14F-4D97-AF65-F5344CB8AC3E}">
-        <p14:creationId xmlns="" xmlns:p14="http://schemas.microsoft.com/office/powerpoint/2010/main" val="75369614"/>
+        <p14:creationId xmlns:p14="http://schemas.microsoft.com/office/powerpoint/2010/main" val="75369614"/>
       </p:ext>
     </p:extLst>
   </p:cSld>
@@ -1301,7 +1302,7 @@
             <a:fld id="{7B9B12EC-6AA0-374B-A2D3-850081A07A26}" type="datetimeFigureOut">
               <a:rPr kumimoji="1" lang="ja-JP" altLang="en-US" smtClean="0"/>
               <a:pPr/>
-              <a:t>2014/10/2</a:t>
+              <a:t>2014/12/17</a:t>
             </a:fld>
             <a:endParaRPr kumimoji="1" lang="ja-JP" altLang="en-US" dirty="0"/>
           </a:p>
@@ -1344,7 +1345,7 @@
             <a:fld id="{767EF739-006C-E447-A3B9-2B495A864FAC}" type="slidenum">
               <a:rPr kumimoji="1" lang="ja-JP" altLang="en-US" smtClean="0"/>
               <a:pPr/>
-              <a:t>&lt;#&gt;</a:t>
+              <a:t>‹#›</a:t>
             </a:fld>
             <a:endParaRPr kumimoji="1" lang="ja-JP" altLang="en-US" dirty="0"/>
           </a:p>
@@ -1353,7 +1354,7 @@
     </p:spTree>
     <p:extLst>
       <p:ext uri="{BB962C8B-B14F-4D97-AF65-F5344CB8AC3E}">
-        <p14:creationId xmlns="" xmlns:p14="http://schemas.microsoft.com/office/powerpoint/2010/main" val="956610528"/>
+        <p14:creationId xmlns:p14="http://schemas.microsoft.com/office/powerpoint/2010/main" val="956610528"/>
       </p:ext>
     </p:extLst>
   </p:cSld>
@@ -1549,7 +1550,7 @@
             <a:fld id="{7B9B12EC-6AA0-374B-A2D3-850081A07A26}" type="datetimeFigureOut">
               <a:rPr kumimoji="1" lang="ja-JP" altLang="en-US" smtClean="0"/>
               <a:pPr/>
-              <a:t>2014/10/2</a:t>
+              <a:t>2014/12/17</a:t>
             </a:fld>
             <a:endParaRPr kumimoji="1" lang="ja-JP" altLang="en-US" dirty="0"/>
           </a:p>
@@ -1592,7 +1593,7 @@
             <a:fld id="{767EF739-006C-E447-A3B9-2B495A864FAC}" type="slidenum">
               <a:rPr kumimoji="1" lang="ja-JP" altLang="en-US" smtClean="0"/>
               <a:pPr/>
-              <a:t>&lt;#&gt;</a:t>
+              <a:t>‹#›</a:t>
             </a:fld>
             <a:endParaRPr kumimoji="1" lang="ja-JP" altLang="en-US" dirty="0"/>
           </a:p>
@@ -1601,7 +1602,7 @@
     </p:spTree>
     <p:extLst>
       <p:ext uri="{BB962C8B-B14F-4D97-AF65-F5344CB8AC3E}">
-        <p14:creationId xmlns="" xmlns:p14="http://schemas.microsoft.com/office/powerpoint/2010/main" val="492095304"/>
+        <p14:creationId xmlns:p14="http://schemas.microsoft.com/office/powerpoint/2010/main" val="492095304"/>
       </p:ext>
     </p:extLst>
   </p:cSld>
@@ -1903,7 +1904,7 @@
             <a:fld id="{7B9B12EC-6AA0-374B-A2D3-850081A07A26}" type="datetimeFigureOut">
               <a:rPr kumimoji="1" lang="ja-JP" altLang="en-US" smtClean="0"/>
               <a:pPr/>
-              <a:t>2014/10/2</a:t>
+              <a:t>2014/12/17</a:t>
             </a:fld>
             <a:endParaRPr kumimoji="1" lang="ja-JP" altLang="en-US" dirty="0"/>
           </a:p>
@@ -1946,7 +1947,7 @@
             <a:fld id="{767EF739-006C-E447-A3B9-2B495A864FAC}" type="slidenum">
               <a:rPr kumimoji="1" lang="ja-JP" altLang="en-US" smtClean="0"/>
               <a:pPr/>
-              <a:t>&lt;#&gt;</a:t>
+              <a:t>‹#›</a:t>
             </a:fld>
             <a:endParaRPr kumimoji="1" lang="ja-JP" altLang="en-US" dirty="0"/>
           </a:p>
@@ -1955,7 +1956,7 @@
     </p:spTree>
     <p:extLst>
       <p:ext uri="{BB962C8B-B14F-4D97-AF65-F5344CB8AC3E}">
-        <p14:creationId xmlns="" xmlns:p14="http://schemas.microsoft.com/office/powerpoint/2010/main" val="1557712202"/>
+        <p14:creationId xmlns:p14="http://schemas.microsoft.com/office/powerpoint/2010/main" val="1557712202"/>
       </p:ext>
     </p:extLst>
   </p:cSld>
@@ -2391,7 +2392,7 @@
             <a:fld id="{7B9B12EC-6AA0-374B-A2D3-850081A07A26}" type="datetimeFigureOut">
               <a:rPr kumimoji="1" lang="ja-JP" altLang="en-US" smtClean="0"/>
               <a:pPr/>
-              <a:t>2014/10/2</a:t>
+              <a:t>2014/12/17</a:t>
             </a:fld>
             <a:endParaRPr kumimoji="1" lang="ja-JP" altLang="en-US" dirty="0"/>
           </a:p>
@@ -2434,7 +2435,7 @@
             <a:fld id="{767EF739-006C-E447-A3B9-2B495A864FAC}" type="slidenum">
               <a:rPr kumimoji="1" lang="ja-JP" altLang="en-US" smtClean="0"/>
               <a:pPr/>
-              <a:t>&lt;#&gt;</a:t>
+              <a:t>‹#›</a:t>
             </a:fld>
             <a:endParaRPr kumimoji="1" lang="ja-JP" altLang="en-US" dirty="0"/>
           </a:p>
@@ -2443,7 +2444,7 @@
     </p:spTree>
     <p:extLst>
       <p:ext uri="{BB962C8B-B14F-4D97-AF65-F5344CB8AC3E}">
-        <p14:creationId xmlns="" xmlns:p14="http://schemas.microsoft.com/office/powerpoint/2010/main" val="638338655"/>
+        <p14:creationId xmlns:p14="http://schemas.microsoft.com/office/powerpoint/2010/main" val="638338655"/>
       </p:ext>
     </p:extLst>
   </p:cSld>
@@ -2511,7 +2512,7 @@
             <a:fld id="{7B9B12EC-6AA0-374B-A2D3-850081A07A26}" type="datetimeFigureOut">
               <a:rPr kumimoji="1" lang="ja-JP" altLang="en-US" smtClean="0"/>
               <a:pPr/>
-              <a:t>2014/10/2</a:t>
+              <a:t>2014/12/17</a:t>
             </a:fld>
             <a:endParaRPr kumimoji="1" lang="ja-JP" altLang="en-US" dirty="0"/>
           </a:p>
@@ -2554,7 +2555,7 @@
             <a:fld id="{767EF739-006C-E447-A3B9-2B495A864FAC}" type="slidenum">
               <a:rPr kumimoji="1" lang="ja-JP" altLang="en-US" smtClean="0"/>
               <a:pPr/>
-              <a:t>&lt;#&gt;</a:t>
+              <a:t>‹#›</a:t>
             </a:fld>
             <a:endParaRPr kumimoji="1" lang="ja-JP" altLang="en-US" dirty="0"/>
           </a:p>
@@ -2563,7 +2564,7 @@
     </p:spTree>
     <p:extLst>
       <p:ext uri="{BB962C8B-B14F-4D97-AF65-F5344CB8AC3E}">
-        <p14:creationId xmlns="" xmlns:p14="http://schemas.microsoft.com/office/powerpoint/2010/main" val="2063778013"/>
+        <p14:creationId xmlns:p14="http://schemas.microsoft.com/office/powerpoint/2010/main" val="2063778013"/>
       </p:ext>
     </p:extLst>
   </p:cSld>
@@ -2608,7 +2609,7 @@
             <a:fld id="{7B9B12EC-6AA0-374B-A2D3-850081A07A26}" type="datetimeFigureOut">
               <a:rPr kumimoji="1" lang="ja-JP" altLang="en-US" smtClean="0"/>
               <a:pPr/>
-              <a:t>2014/10/2</a:t>
+              <a:t>2014/12/17</a:t>
             </a:fld>
             <a:endParaRPr kumimoji="1" lang="ja-JP" altLang="en-US" dirty="0"/>
           </a:p>
@@ -2651,7 +2652,7 @@
             <a:fld id="{767EF739-006C-E447-A3B9-2B495A864FAC}" type="slidenum">
               <a:rPr kumimoji="1" lang="ja-JP" altLang="en-US" smtClean="0"/>
               <a:pPr/>
-              <a:t>&lt;#&gt;</a:t>
+              <a:t>‹#›</a:t>
             </a:fld>
             <a:endParaRPr kumimoji="1" lang="ja-JP" altLang="en-US" dirty="0"/>
           </a:p>
@@ -2660,7 +2661,7 @@
     </p:spTree>
     <p:extLst>
       <p:ext uri="{BB962C8B-B14F-4D97-AF65-F5344CB8AC3E}">
-        <p14:creationId xmlns="" xmlns:p14="http://schemas.microsoft.com/office/powerpoint/2010/main" val="1575323657"/>
+        <p14:creationId xmlns:p14="http://schemas.microsoft.com/office/powerpoint/2010/main" val="1575323657"/>
       </p:ext>
     </p:extLst>
   </p:cSld>
@@ -2919,7 +2920,7 @@
             <a:fld id="{7B9B12EC-6AA0-374B-A2D3-850081A07A26}" type="datetimeFigureOut">
               <a:rPr kumimoji="1" lang="ja-JP" altLang="en-US" smtClean="0"/>
               <a:pPr/>
-              <a:t>2014/10/2</a:t>
+              <a:t>2014/12/17</a:t>
             </a:fld>
             <a:endParaRPr kumimoji="1" lang="ja-JP" altLang="en-US" dirty="0"/>
           </a:p>
@@ -2962,7 +2963,7 @@
             <a:fld id="{767EF739-006C-E447-A3B9-2B495A864FAC}" type="slidenum">
               <a:rPr kumimoji="1" lang="ja-JP" altLang="en-US" smtClean="0"/>
               <a:pPr/>
-              <a:t>&lt;#&gt;</a:t>
+              <a:t>‹#›</a:t>
             </a:fld>
             <a:endParaRPr kumimoji="1" lang="ja-JP" altLang="en-US" dirty="0"/>
           </a:p>
@@ -2971,7 +2972,7 @@
     </p:spTree>
     <p:extLst>
       <p:ext uri="{BB962C8B-B14F-4D97-AF65-F5344CB8AC3E}">
-        <p14:creationId xmlns="" xmlns:p14="http://schemas.microsoft.com/office/powerpoint/2010/main" val="3549694789"/>
+        <p14:creationId xmlns:p14="http://schemas.microsoft.com/office/powerpoint/2010/main" val="3549694789"/>
       </p:ext>
     </p:extLst>
   </p:cSld>
@@ -3174,7 +3175,7 @@
             <a:fld id="{7B9B12EC-6AA0-374B-A2D3-850081A07A26}" type="datetimeFigureOut">
               <a:rPr kumimoji="1" lang="ja-JP" altLang="en-US" smtClean="0"/>
               <a:pPr/>
-              <a:t>2014/10/2</a:t>
+              <a:t>2014/12/17</a:t>
             </a:fld>
             <a:endParaRPr kumimoji="1" lang="ja-JP" altLang="en-US" dirty="0"/>
           </a:p>
@@ -3217,7 +3218,7 @@
             <a:fld id="{767EF739-006C-E447-A3B9-2B495A864FAC}" type="slidenum">
               <a:rPr kumimoji="1" lang="ja-JP" altLang="en-US" smtClean="0"/>
               <a:pPr/>
-              <a:t>&lt;#&gt;</a:t>
+              <a:t>‹#›</a:t>
             </a:fld>
             <a:endParaRPr kumimoji="1" lang="ja-JP" altLang="en-US" dirty="0"/>
           </a:p>
@@ -3226,7 +3227,7 @@
     </p:spTree>
     <p:extLst>
       <p:ext uri="{BB962C8B-B14F-4D97-AF65-F5344CB8AC3E}">
-        <p14:creationId xmlns="" xmlns:p14="http://schemas.microsoft.com/office/powerpoint/2010/main" val="2928006269"/>
+        <p14:creationId xmlns:p14="http://schemas.microsoft.com/office/powerpoint/2010/main" val="2928006269"/>
       </p:ext>
     </p:extLst>
   </p:cSld>
@@ -3421,7 +3422,7 @@
             <a:fld id="{7B9B12EC-6AA0-374B-A2D3-850081A07A26}" type="datetimeFigureOut">
               <a:rPr kumimoji="1" lang="ja-JP" altLang="en-US" smtClean="0"/>
               <a:pPr/>
-              <a:t>2014/10/2</a:t>
+              <a:t>2014/12/17</a:t>
             </a:fld>
             <a:endParaRPr kumimoji="1" lang="ja-JP" altLang="en-US" dirty="0"/>
           </a:p>
@@ -3500,7 +3501,7 @@
             <a:fld id="{767EF739-006C-E447-A3B9-2B495A864FAC}" type="slidenum">
               <a:rPr kumimoji="1" lang="ja-JP" altLang="en-US" smtClean="0"/>
               <a:pPr/>
-              <a:t>&lt;#&gt;</a:t>
+              <a:t>‹#›</a:t>
             </a:fld>
             <a:endParaRPr kumimoji="1" lang="ja-JP" altLang="en-US" dirty="0"/>
           </a:p>
@@ -3509,7 +3510,7 @@
     </p:spTree>
     <p:extLst>
       <p:ext uri="{BB962C8B-B14F-4D97-AF65-F5344CB8AC3E}">
-        <p14:creationId xmlns="" xmlns:p14="http://schemas.microsoft.com/office/powerpoint/2010/main" val="1919167372"/>
+        <p14:creationId xmlns:p14="http://schemas.microsoft.com/office/powerpoint/2010/main" val="1919167372"/>
       </p:ext>
     </p:extLst>
   </p:cSld>
@@ -5433,6 +5434,13 @@
   <p:clrMapOvr>
     <a:masterClrMapping/>
   </p:clrMapOvr>
+  <p:timing>
+    <p:tnLst>
+      <p:par>
+        <p:cTn id="1" dur="indefinite" restart="never" nodeType="tmRoot"/>
+      </p:par>
+    </p:tnLst>
+  </p:timing>
 </p:sld>
 </file>
 
@@ -7333,10 +7341,2074 @@
   <p:clrMapOvr>
     <a:masterClrMapping/>
   </p:clrMapOvr>
+  <p:timing>
+    <p:tnLst>
+      <p:par>
+        <p:cTn id="1" dur="indefinite" restart="never" nodeType="tmRoot"/>
+      </p:par>
+    </p:tnLst>
+  </p:timing>
 </p:sld>
 </file>
 
 <file path=ppt/slides/slide3.xml><?xml version="1.0" encoding="utf-8"?>
+<p:sld xmlns:a="http://schemas.openxmlformats.org/drawingml/2006/main" xmlns:r="http://schemas.openxmlformats.org/officeDocument/2006/relationships" xmlns:p="http://schemas.openxmlformats.org/presentationml/2006/main">
+  <p:cSld>
+    <p:spTree>
+      <p:nvGrpSpPr>
+        <p:cNvPr id="1" name=""/>
+        <p:cNvGrpSpPr/>
+        <p:nvPr/>
+      </p:nvGrpSpPr>
+      <p:grpSpPr>
+        <a:xfrm>
+          <a:off x="0" y="0"/>
+          <a:ext cx="0" cy="0"/>
+          <a:chOff x="0" y="0"/>
+          <a:chExt cx="0" cy="0"/>
+        </a:xfrm>
+      </p:grpSpPr>
+      <p:sp>
+        <p:nvSpPr>
+          <p:cNvPr id="4" name="正方形/長方形 3"/>
+          <p:cNvSpPr/>
+          <p:nvPr/>
+        </p:nvSpPr>
+        <p:spPr>
+          <a:xfrm>
+            <a:off x="141639" y="315913"/>
+            <a:ext cx="5705473" cy="969962"/>
+          </a:xfrm>
+          <a:prstGeom prst="rect">
+            <a:avLst/>
+          </a:prstGeom>
+          <a:noFill/>
+          <a:ln>
+            <a:solidFill>
+              <a:schemeClr val="tx1"/>
+            </a:solidFill>
+          </a:ln>
+          <a:effectLst/>
+        </p:spPr>
+        <p:style>
+          <a:lnRef idx="1">
+            <a:schemeClr val="accent1"/>
+          </a:lnRef>
+          <a:fillRef idx="3">
+            <a:schemeClr val="accent1"/>
+          </a:fillRef>
+          <a:effectRef idx="2">
+            <a:schemeClr val="accent1"/>
+          </a:effectRef>
+          <a:fontRef idx="minor">
+            <a:schemeClr val="lt1"/>
+          </a:fontRef>
+        </p:style>
+        <p:txBody>
+          <a:bodyPr rtlCol="0" anchor="ctr"/>
+          <a:lstStyle/>
+          <a:p>
+            <a:r>
+              <a:rPr lang="en-US" sz="1200" dirty="0">
+                <a:solidFill>
+                  <a:schemeClr val="tx1"/>
+                </a:solidFill>
+              </a:rPr>
+              <a:t>&lt;bean id="</a:t>
+            </a:r>
+            <a:r>
+              <a:rPr lang="en-US" sz="1200" b="1" dirty="0" smtClean="0">
+                <a:solidFill>
+                  <a:schemeClr val="accent1"/>
+                </a:solidFill>
+              </a:rPr>
+              <a:t>CL_ORDERSTATUS</a:t>
+            </a:r>
+            <a:r>
+              <a:rPr lang="en-US" sz="1200" dirty="0">
+                <a:solidFill>
+                  <a:schemeClr val="tx1"/>
+                </a:solidFill>
+              </a:rPr>
+              <a:t>"</a:t>
+            </a:r>
+          </a:p>
+          <a:p>
+            <a:r>
+              <a:rPr lang="en-US" sz="1200" dirty="0">
+                <a:solidFill>
+                  <a:schemeClr val="tx1"/>
+                </a:solidFill>
+              </a:rPr>
+              <a:t>      class="</a:t>
+            </a:r>
+            <a:r>
+              <a:rPr lang="en-US" sz="1200" dirty="0" err="1">
+                <a:solidFill>
+                  <a:schemeClr val="tx1"/>
+                </a:solidFill>
+              </a:rPr>
+              <a:t>org.terasoluna.gfw.common.codelist.EnumCodeList</a:t>
+            </a:r>
+            <a:r>
+              <a:rPr lang="en-US" sz="1200" dirty="0">
+                <a:solidFill>
+                  <a:schemeClr val="tx1"/>
+                </a:solidFill>
+              </a:rPr>
+              <a:t>"&gt;</a:t>
+            </a:r>
+          </a:p>
+          <a:p>
+            <a:r>
+              <a:rPr lang="en-US" sz="1200" dirty="0">
+                <a:solidFill>
+                  <a:schemeClr val="tx1"/>
+                </a:solidFill>
+              </a:rPr>
+              <a:t>    </a:t>
+            </a:r>
+            <a:r>
+              <a:rPr lang="en-US" sz="1400" b="1" dirty="0">
+                <a:solidFill>
+                  <a:schemeClr val="tx1"/>
+                </a:solidFill>
+              </a:rPr>
+              <a:t>&lt;constructor-</a:t>
+            </a:r>
+            <a:r>
+              <a:rPr lang="en-US" sz="1400" b="1" dirty="0" err="1">
+                <a:solidFill>
+                  <a:schemeClr val="tx1"/>
+                </a:solidFill>
+              </a:rPr>
+              <a:t>arg</a:t>
+            </a:r>
+            <a:r>
+              <a:rPr lang="en-US" sz="1400" b="1" dirty="0">
+                <a:solidFill>
+                  <a:schemeClr val="tx1"/>
+                </a:solidFill>
+              </a:rPr>
+              <a:t> value</a:t>
+            </a:r>
+            <a:r>
+              <a:rPr lang="en-US" sz="1400" b="1" dirty="0" smtClean="0">
+                <a:solidFill>
+                  <a:schemeClr val="tx1"/>
+                </a:solidFill>
+              </a:rPr>
+              <a:t>="</a:t>
+            </a:r>
+            <a:r>
+              <a:rPr lang="en-US" sz="1400" b="1" dirty="0" err="1" smtClean="0">
+                <a:solidFill>
+                  <a:schemeClr val="tx1"/>
+                </a:solidFill>
+              </a:rPr>
+              <a:t>com.example.domain.model.OrderStatus</a:t>
+            </a:r>
+            <a:r>
+              <a:rPr lang="en-US" sz="1400" b="1" dirty="0">
+                <a:solidFill>
+                  <a:schemeClr val="tx1"/>
+                </a:solidFill>
+              </a:rPr>
+              <a:t>" /&gt;</a:t>
+            </a:r>
+          </a:p>
+          <a:p>
+            <a:r>
+              <a:rPr lang="en-US" sz="1200" dirty="0">
+                <a:solidFill>
+                  <a:schemeClr val="tx1"/>
+                </a:solidFill>
+              </a:rPr>
+              <a:t>&lt;/bean&gt;</a:t>
+            </a:r>
+          </a:p>
+        </p:txBody>
+      </p:sp>
+      <p:graphicFrame>
+        <p:nvGraphicFramePr>
+          <p:cNvPr id="5" name="表 4"/>
+          <p:cNvGraphicFramePr>
+            <a:graphicFrameLocks noGrp="1"/>
+          </p:cNvGraphicFramePr>
+          <p:nvPr>
+            <p:extLst>
+              <p:ext uri="{D42A27DB-BD31-4B8C-83A1-F6EECF244321}">
+                <p14:modId xmlns:p14="http://schemas.microsoft.com/office/powerpoint/2010/main" val="1107974740"/>
+              </p:ext>
+            </p:extLst>
+          </p:nvPr>
+        </p:nvGraphicFramePr>
+        <p:xfrm>
+          <a:off x="3861536" y="2096346"/>
+          <a:ext cx="2074863" cy="1219200"/>
+        </p:xfrm>
+        <a:graphic>
+          <a:graphicData uri="http://schemas.openxmlformats.org/drawingml/2006/table">
+            <a:tbl>
+              <a:tblPr firstRow="1" bandRow="1">
+                <a:tableStyleId>{5C22544A-7EE6-4342-B048-85BDC9FD1C3A}</a:tableStyleId>
+              </a:tblPr>
+              <a:tblGrid>
+                <a:gridCol w="983361"/>
+                <a:gridCol w="1091502"/>
+              </a:tblGrid>
+              <a:tr h="154781">
+                <a:tc>
+                  <a:txBody>
+                    <a:bodyPr/>
+                    <a:lstStyle/>
+                    <a:p>
+                      <a:pPr algn="ctr"/>
+                      <a:r>
+                        <a:rPr kumimoji="1" lang="en-US" altLang="ja-JP" sz="1400" dirty="0" smtClean="0"/>
+                        <a:t>value(key)</a:t>
+                      </a:r>
+                      <a:endParaRPr kumimoji="1" lang="ja-JP" altLang="en-US" sz="1400" dirty="0"/>
+                    </a:p>
+                  </a:txBody>
+                  <a:tcPr/>
+                </a:tc>
+                <a:tc>
+                  <a:txBody>
+                    <a:bodyPr/>
+                    <a:lstStyle/>
+                    <a:p>
+                      <a:pPr algn="ctr"/>
+                      <a:r>
+                        <a:rPr kumimoji="1" lang="en-US" altLang="ja-JP" sz="1400" dirty="0" smtClean="0"/>
+                        <a:t>label(value)</a:t>
+                      </a:r>
+                      <a:endParaRPr kumimoji="1" lang="ja-JP" altLang="en-US" sz="1400" dirty="0"/>
+                    </a:p>
+                  </a:txBody>
+                  <a:tcPr/>
+                </a:tc>
+              </a:tr>
+              <a:tr h="154781">
+                <a:tc>
+                  <a:txBody>
+                    <a:bodyPr/>
+                    <a:lstStyle/>
+                    <a:p>
+                      <a:pPr algn="ctr"/>
+                      <a:r>
+                        <a:rPr kumimoji="1" lang="en-US" altLang="ja-JP" sz="1400" dirty="0" smtClean="0"/>
+                        <a:t>1</a:t>
+                      </a:r>
+                      <a:endParaRPr kumimoji="1" lang="ja-JP" altLang="en-US" sz="1400" dirty="0"/>
+                    </a:p>
+                  </a:txBody>
+                  <a:tcPr/>
+                </a:tc>
+                <a:tc>
+                  <a:txBody>
+                    <a:bodyPr/>
+                    <a:lstStyle/>
+                    <a:p>
+                      <a:pPr algn="ctr"/>
+                      <a:r>
+                        <a:rPr kumimoji="1" lang="en-US" altLang="ja-JP" sz="1400" dirty="0" smtClean="0"/>
+                        <a:t>Received</a:t>
+                      </a:r>
+                      <a:endParaRPr kumimoji="1" lang="ja-JP" altLang="en-US" sz="1400" dirty="0"/>
+                    </a:p>
+                  </a:txBody>
+                  <a:tcPr/>
+                </a:tc>
+              </a:tr>
+              <a:tr h="154781">
+                <a:tc>
+                  <a:txBody>
+                    <a:bodyPr/>
+                    <a:lstStyle/>
+                    <a:p>
+                      <a:pPr algn="ctr"/>
+                      <a:r>
+                        <a:rPr kumimoji="1" lang="en-US" altLang="ja-JP" sz="1400" dirty="0" smtClean="0"/>
+                        <a:t>2</a:t>
+                      </a:r>
+                      <a:endParaRPr kumimoji="1" lang="ja-JP" altLang="en-US" sz="1400" dirty="0"/>
+                    </a:p>
+                  </a:txBody>
+                  <a:tcPr/>
+                </a:tc>
+                <a:tc>
+                  <a:txBody>
+                    <a:bodyPr/>
+                    <a:lstStyle/>
+                    <a:p>
+                      <a:pPr algn="ctr"/>
+                      <a:r>
+                        <a:rPr kumimoji="1" lang="en-US" altLang="ja-JP" sz="1400" dirty="0" smtClean="0"/>
+                        <a:t>Sent</a:t>
+                      </a:r>
+                      <a:endParaRPr kumimoji="1" lang="ja-JP" altLang="en-US" sz="1400" dirty="0"/>
+                    </a:p>
+                  </a:txBody>
+                  <a:tcPr/>
+                </a:tc>
+              </a:tr>
+              <a:tr h="154781">
+                <a:tc>
+                  <a:txBody>
+                    <a:bodyPr/>
+                    <a:lstStyle/>
+                    <a:p>
+                      <a:pPr algn="ctr"/>
+                      <a:r>
+                        <a:rPr kumimoji="1" lang="en-US" altLang="ja-JP" sz="1400" dirty="0" smtClean="0"/>
+                        <a:t>3</a:t>
+                      </a:r>
+                      <a:endParaRPr kumimoji="1" lang="ja-JP" altLang="en-US" sz="1400" dirty="0"/>
+                    </a:p>
+                  </a:txBody>
+                  <a:tcPr/>
+                </a:tc>
+                <a:tc>
+                  <a:txBody>
+                    <a:bodyPr/>
+                    <a:lstStyle/>
+                    <a:p>
+                      <a:pPr algn="ctr"/>
+                      <a:r>
+                        <a:rPr kumimoji="1" lang="en-US" altLang="ja-JP" sz="1400" dirty="0" smtClean="0"/>
+                        <a:t>Cancelled</a:t>
+                      </a:r>
+                      <a:endParaRPr kumimoji="1" lang="ja-JP" altLang="en-US" sz="1400" dirty="0"/>
+                    </a:p>
+                  </a:txBody>
+                  <a:tcPr/>
+                </a:tc>
+              </a:tr>
+            </a:tbl>
+          </a:graphicData>
+        </a:graphic>
+      </p:graphicFrame>
+      <p:sp>
+        <p:nvSpPr>
+          <p:cNvPr id="6" name="正方形/長方形 5"/>
+          <p:cNvSpPr/>
+          <p:nvPr/>
+        </p:nvSpPr>
+        <p:spPr>
+          <a:xfrm>
+            <a:off x="3506960" y="1772819"/>
+            <a:ext cx="2779540" cy="361627"/>
+          </a:xfrm>
+          <a:prstGeom prst="rect">
+            <a:avLst/>
+          </a:prstGeom>
+          <a:noFill/>
+          <a:ln>
+            <a:noFill/>
+          </a:ln>
+          <a:effectLst/>
+        </p:spPr>
+        <p:style>
+          <a:lnRef idx="1">
+            <a:schemeClr val="accent1"/>
+          </a:lnRef>
+          <a:fillRef idx="3">
+            <a:schemeClr val="accent1"/>
+          </a:fillRef>
+          <a:effectRef idx="2">
+            <a:schemeClr val="accent1"/>
+          </a:effectRef>
+          <a:fontRef idx="minor">
+            <a:schemeClr val="lt1"/>
+          </a:fontRef>
+        </p:style>
+        <p:txBody>
+          <a:bodyPr rtlCol="0" anchor="ctr"/>
+          <a:lstStyle/>
+          <a:p>
+            <a:pPr algn="ctr"/>
+            <a:r>
+              <a:rPr lang="en-US" altLang="ja-JP" sz="1200" b="1" dirty="0" smtClean="0">
+                <a:solidFill>
+                  <a:schemeClr val="tx1"/>
+                </a:solidFill>
+              </a:rPr>
+              <a:t>Map&lt;String,String&gt; </a:t>
+            </a:r>
+            <a:r>
+              <a:rPr lang="en-US" sz="1200" b="1" dirty="0" smtClean="0">
+                <a:solidFill>
+                  <a:schemeClr val="accent1"/>
+                </a:solidFill>
+              </a:rPr>
+              <a:t>CL_ORDERSTATUS</a:t>
+            </a:r>
+            <a:endParaRPr kumimoji="1" lang="ja-JP" altLang="en-US" sz="1200" b="1" dirty="0">
+              <a:solidFill>
+                <a:schemeClr val="accent1"/>
+              </a:solidFill>
+            </a:endParaRPr>
+          </a:p>
+        </p:txBody>
+      </p:sp>
+      <p:sp>
+        <p:nvSpPr>
+          <p:cNvPr id="11" name="正方形/長方形 10"/>
+          <p:cNvSpPr/>
+          <p:nvPr/>
+        </p:nvSpPr>
+        <p:spPr>
+          <a:xfrm>
+            <a:off x="9525" y="95250"/>
+            <a:ext cx="2562226" cy="182562"/>
+          </a:xfrm>
+          <a:prstGeom prst="rect">
+            <a:avLst/>
+          </a:prstGeom>
+          <a:noFill/>
+          <a:ln>
+            <a:noFill/>
+          </a:ln>
+          <a:effectLst/>
+        </p:spPr>
+        <p:style>
+          <a:lnRef idx="1">
+            <a:schemeClr val="accent1"/>
+          </a:lnRef>
+          <a:fillRef idx="3">
+            <a:schemeClr val="accent1"/>
+          </a:fillRef>
+          <a:effectRef idx="2">
+            <a:schemeClr val="accent1"/>
+          </a:effectRef>
+          <a:fontRef idx="minor">
+            <a:schemeClr val="lt1"/>
+          </a:fontRef>
+        </p:style>
+        <p:txBody>
+          <a:bodyPr rtlCol="0" anchor="ctr"/>
+          <a:lstStyle/>
+          <a:p>
+            <a:r>
+              <a:rPr kumimoji="1" lang="en-US" altLang="ja-JP" sz="1600" b="1" dirty="0" smtClean="0">
+                <a:solidFill>
+                  <a:schemeClr val="tx1"/>
+                </a:solidFill>
+              </a:rPr>
+              <a:t>codelist.xml</a:t>
+            </a:r>
+            <a:endParaRPr kumimoji="1" lang="ja-JP" altLang="en-US" sz="1600" dirty="0">
+              <a:solidFill>
+                <a:schemeClr val="accent2">
+                  <a:lumMod val="60000"/>
+                  <a:lumOff val="40000"/>
+                </a:schemeClr>
+              </a:solidFill>
+            </a:endParaRPr>
+          </a:p>
+        </p:txBody>
+      </p:sp>
+      <p:sp>
+        <p:nvSpPr>
+          <p:cNvPr id="2" name="正方形/長方形 1"/>
+          <p:cNvSpPr/>
+          <p:nvPr/>
+        </p:nvSpPr>
+        <p:spPr>
+          <a:xfrm>
+            <a:off x="123827" y="1795778"/>
+            <a:ext cx="3315718" cy="3677930"/>
+          </a:xfrm>
+          <a:prstGeom prst="rect">
+            <a:avLst/>
+          </a:prstGeom>
+          <a:ln>
+            <a:solidFill>
+              <a:schemeClr val="tx1"/>
+            </a:solidFill>
+          </a:ln>
+        </p:spPr>
+        <p:txBody>
+          <a:bodyPr wrap="square">
+            <a:spAutoFit/>
+          </a:bodyPr>
+          <a:lstStyle/>
+          <a:p>
+            <a:r>
+              <a:rPr lang="en-US" altLang="ja-JP" sz="1200" dirty="0" smtClean="0"/>
+              <a:t>public </a:t>
+            </a:r>
+            <a:r>
+              <a:rPr lang="en-US" altLang="ja-JP" sz="1200" dirty="0" err="1"/>
+              <a:t>enum</a:t>
+            </a:r>
+            <a:r>
+              <a:rPr lang="en-US" altLang="ja-JP" sz="1200" dirty="0"/>
+              <a:t> </a:t>
+            </a:r>
+            <a:r>
+              <a:rPr lang="en-US" altLang="ja-JP" sz="1400" b="1" dirty="0" err="1" smtClean="0"/>
+              <a:t>OrderStatus</a:t>
+            </a:r>
+            <a:endParaRPr lang="en-US" altLang="ja-JP" sz="1400" b="1" dirty="0" smtClean="0"/>
+          </a:p>
+          <a:p>
+            <a:r>
+              <a:rPr lang="en-US" altLang="ja-JP" sz="1200" dirty="0"/>
+              <a:t> </a:t>
+            </a:r>
+            <a:r>
+              <a:rPr lang="en-US" altLang="ja-JP" sz="1200" dirty="0" smtClean="0"/>
+              <a:t>   implements </a:t>
+            </a:r>
+            <a:r>
+              <a:rPr lang="en-US" altLang="ja-JP" sz="1400" b="1" dirty="0" err="1"/>
+              <a:t>EnumCodeList.CodeListItem</a:t>
+            </a:r>
+            <a:r>
+              <a:rPr lang="en-US" altLang="ja-JP" sz="1200" dirty="0"/>
+              <a:t> {</a:t>
+            </a:r>
+          </a:p>
+          <a:p>
+            <a:endParaRPr lang="en-US" altLang="ja-JP" sz="1200" dirty="0" smtClean="0"/>
+          </a:p>
+          <a:p>
+            <a:r>
+              <a:rPr lang="en-US" altLang="ja-JP" sz="1400" b="1" dirty="0" smtClean="0"/>
+              <a:t>    </a:t>
+            </a:r>
+            <a:r>
+              <a:rPr lang="en-US" altLang="ja-JP" sz="1600" b="1" dirty="0" smtClean="0"/>
+              <a:t>RECEIVED    </a:t>
+            </a:r>
+            <a:r>
+              <a:rPr lang="ja-JP" altLang="en-US" sz="1600" b="1" dirty="0"/>
+              <a:t> </a:t>
+            </a:r>
+            <a:r>
+              <a:rPr lang="en-US" altLang="ja-JP" sz="1600" b="1" dirty="0" smtClean="0"/>
+              <a:t>("1",   "</a:t>
+            </a:r>
+            <a:r>
+              <a:rPr lang="en-US" altLang="ja-JP" sz="1600" b="1" dirty="0"/>
+              <a:t>Received"), </a:t>
+            </a:r>
+            <a:endParaRPr lang="en-US" altLang="ja-JP" sz="1600" b="1" dirty="0" smtClean="0"/>
+          </a:p>
+          <a:p>
+            <a:r>
+              <a:rPr lang="en-US" altLang="ja-JP" sz="1600" b="1" dirty="0"/>
+              <a:t> </a:t>
+            </a:r>
+            <a:r>
+              <a:rPr lang="en-US" altLang="ja-JP" sz="1600" b="1" dirty="0" smtClean="0"/>
+              <a:t>   SENT             ("2",   "</a:t>
+            </a:r>
+            <a:r>
+              <a:rPr lang="en-US" altLang="ja-JP" sz="1600" b="1" dirty="0"/>
+              <a:t>Sent"), </a:t>
+            </a:r>
+            <a:endParaRPr lang="en-US" altLang="ja-JP" sz="1600" b="1" dirty="0" smtClean="0"/>
+          </a:p>
+          <a:p>
+            <a:r>
+              <a:rPr lang="en-US" altLang="ja-JP" sz="1600" b="1" dirty="0"/>
+              <a:t> </a:t>
+            </a:r>
+            <a:r>
+              <a:rPr lang="en-US" altLang="ja-JP" sz="1600" b="1" dirty="0" smtClean="0"/>
+              <a:t>   CANCELLED ("3",    "</a:t>
+            </a:r>
+            <a:r>
+              <a:rPr lang="en-US" altLang="ja-JP" sz="1600" b="1" dirty="0"/>
+              <a:t>Cancelled");</a:t>
+            </a:r>
+          </a:p>
+          <a:p>
+            <a:endParaRPr lang="en-US" altLang="ja-JP" sz="900" dirty="0"/>
+          </a:p>
+          <a:p>
+            <a:r>
+              <a:rPr lang="en-US" altLang="ja-JP" sz="800" dirty="0"/>
+              <a:t>    private final String value;</a:t>
+            </a:r>
+          </a:p>
+          <a:p>
+            <a:r>
+              <a:rPr lang="en-US" altLang="ja-JP" sz="800" dirty="0"/>
+              <a:t>    private final String label;</a:t>
+            </a:r>
+          </a:p>
+          <a:p>
+            <a:r>
+              <a:rPr lang="en-US" altLang="ja-JP" sz="800" dirty="0" smtClean="0"/>
+              <a:t>    private </a:t>
+            </a:r>
+            <a:r>
+              <a:rPr lang="en-US" altLang="ja-JP" sz="800" dirty="0" err="1"/>
+              <a:t>OrderStatus</a:t>
+            </a:r>
+            <a:r>
+              <a:rPr lang="en-US" altLang="ja-JP" sz="800" dirty="0"/>
+              <a:t>(String </a:t>
+            </a:r>
+            <a:r>
+              <a:rPr lang="en-US" altLang="ja-JP" sz="800" dirty="0" err="1" smtClean="0"/>
+              <a:t>codeValue</a:t>
+            </a:r>
+            <a:r>
+              <a:rPr lang="en-US" altLang="ja-JP" sz="800" dirty="0" smtClean="0"/>
+              <a:t>, </a:t>
+            </a:r>
+            <a:r>
+              <a:rPr lang="en-US" altLang="ja-JP" sz="800" dirty="0"/>
+              <a:t>String </a:t>
+            </a:r>
+            <a:r>
+              <a:rPr lang="en-US" altLang="ja-JP" sz="800" dirty="0" err="1" smtClean="0"/>
+              <a:t>codeLabel</a:t>
+            </a:r>
+            <a:r>
+              <a:rPr lang="en-US" altLang="ja-JP" sz="800" dirty="0"/>
+              <a:t>) {</a:t>
+            </a:r>
+          </a:p>
+          <a:p>
+            <a:r>
+              <a:rPr lang="en-US" altLang="ja-JP" sz="800" dirty="0"/>
+              <a:t>        </a:t>
+            </a:r>
+            <a:r>
+              <a:rPr lang="en-US" altLang="ja-JP" sz="800" dirty="0" err="1"/>
+              <a:t>this.value</a:t>
+            </a:r>
+            <a:r>
+              <a:rPr lang="en-US" altLang="ja-JP" sz="800" dirty="0"/>
+              <a:t> = </a:t>
+            </a:r>
+            <a:r>
+              <a:rPr lang="en-US" altLang="ja-JP" sz="800" dirty="0" err="1" smtClean="0"/>
+              <a:t>codeValue</a:t>
+            </a:r>
+            <a:r>
+              <a:rPr lang="en-US" altLang="ja-JP" sz="800" dirty="0" smtClean="0"/>
+              <a:t>;</a:t>
+            </a:r>
+            <a:endParaRPr lang="en-US" altLang="ja-JP" sz="800" dirty="0"/>
+          </a:p>
+          <a:p>
+            <a:r>
+              <a:rPr lang="en-US" altLang="ja-JP" sz="800" dirty="0"/>
+              <a:t>        </a:t>
+            </a:r>
+            <a:r>
+              <a:rPr lang="en-US" altLang="ja-JP" sz="800" dirty="0" err="1"/>
+              <a:t>this.label</a:t>
+            </a:r>
+            <a:r>
+              <a:rPr lang="en-US" altLang="ja-JP" sz="800" dirty="0"/>
+              <a:t> = </a:t>
+            </a:r>
+            <a:r>
+              <a:rPr lang="en-US" altLang="ja-JP" sz="800" dirty="0" err="1" smtClean="0"/>
+              <a:t>codeLabel</a:t>
+            </a:r>
+            <a:r>
+              <a:rPr lang="en-US" altLang="ja-JP" sz="800" dirty="0"/>
+              <a:t>;</a:t>
+            </a:r>
+          </a:p>
+          <a:p>
+            <a:r>
+              <a:rPr lang="en-US" altLang="ja-JP" sz="800" dirty="0"/>
+              <a:t>    }</a:t>
+            </a:r>
+          </a:p>
+          <a:p>
+            <a:r>
+              <a:rPr lang="en-US" altLang="ja-JP" sz="1000" b="1" dirty="0" smtClean="0"/>
+              <a:t>    @</a:t>
+            </a:r>
+            <a:r>
+              <a:rPr lang="en-US" altLang="ja-JP" sz="1000" b="1" dirty="0"/>
+              <a:t>Override</a:t>
+            </a:r>
+          </a:p>
+          <a:p>
+            <a:r>
+              <a:rPr lang="en-US" altLang="ja-JP" sz="1000" b="1" dirty="0"/>
+              <a:t>    public String </a:t>
+            </a:r>
+            <a:r>
+              <a:rPr lang="en-US" altLang="ja-JP" sz="1000" b="1" dirty="0" err="1"/>
+              <a:t>getCodeValue</a:t>
+            </a:r>
+            <a:r>
+              <a:rPr lang="en-US" altLang="ja-JP" sz="1000" b="1" dirty="0"/>
+              <a:t>() {</a:t>
+            </a:r>
+          </a:p>
+          <a:p>
+            <a:r>
+              <a:rPr lang="en-US" altLang="ja-JP" sz="1000" b="1" dirty="0"/>
+              <a:t>        return value;</a:t>
+            </a:r>
+          </a:p>
+          <a:p>
+            <a:r>
+              <a:rPr lang="en-US" altLang="ja-JP" sz="1000" b="1" dirty="0"/>
+              <a:t>    }</a:t>
+            </a:r>
+          </a:p>
+          <a:p>
+            <a:r>
+              <a:rPr lang="en-US" altLang="ja-JP" sz="1000" b="1" dirty="0" smtClean="0"/>
+              <a:t>    </a:t>
+            </a:r>
+            <a:r>
+              <a:rPr lang="en-US" altLang="ja-JP" sz="1000" b="1" dirty="0"/>
+              <a:t>@Override</a:t>
+            </a:r>
+          </a:p>
+          <a:p>
+            <a:r>
+              <a:rPr lang="en-US" altLang="ja-JP" sz="1000" b="1" dirty="0"/>
+              <a:t>    public String </a:t>
+            </a:r>
+            <a:r>
+              <a:rPr lang="en-US" altLang="ja-JP" sz="1000" b="1" dirty="0" err="1"/>
+              <a:t>getCodeLabel</a:t>
+            </a:r>
+            <a:r>
+              <a:rPr lang="en-US" altLang="ja-JP" sz="1000" b="1" dirty="0"/>
+              <a:t>() {</a:t>
+            </a:r>
+          </a:p>
+          <a:p>
+            <a:r>
+              <a:rPr lang="en-US" altLang="ja-JP" sz="1000" b="1" dirty="0"/>
+              <a:t>        return label;</a:t>
+            </a:r>
+          </a:p>
+          <a:p>
+            <a:r>
+              <a:rPr lang="en-US" altLang="ja-JP" sz="1000" b="1" dirty="0"/>
+              <a:t>    }</a:t>
+            </a:r>
+          </a:p>
+          <a:p>
+            <a:r>
+              <a:rPr lang="en-US" altLang="ja-JP" sz="800" dirty="0"/>
+              <a:t>}</a:t>
+            </a:r>
+          </a:p>
+        </p:txBody>
+      </p:sp>
+      <p:sp>
+        <p:nvSpPr>
+          <p:cNvPr id="42" name="正方形/長方形 41"/>
+          <p:cNvSpPr/>
+          <p:nvPr/>
+        </p:nvSpPr>
+        <p:spPr>
+          <a:xfrm>
+            <a:off x="5562206" y="5458921"/>
+            <a:ext cx="3429394" cy="1123949"/>
+          </a:xfrm>
+          <a:prstGeom prst="rect">
+            <a:avLst/>
+          </a:prstGeom>
+          <a:noFill/>
+          <a:ln>
+            <a:solidFill>
+              <a:schemeClr val="tx1"/>
+            </a:solidFill>
+          </a:ln>
+          <a:effectLst/>
+        </p:spPr>
+        <p:style>
+          <a:lnRef idx="1">
+            <a:schemeClr val="accent1"/>
+          </a:lnRef>
+          <a:fillRef idx="3">
+            <a:schemeClr val="accent1"/>
+          </a:fillRef>
+          <a:effectRef idx="2">
+            <a:schemeClr val="accent1"/>
+          </a:effectRef>
+          <a:fontRef idx="minor">
+            <a:schemeClr val="lt1"/>
+          </a:fontRef>
+        </p:style>
+        <p:txBody>
+          <a:bodyPr rtlCol="0" anchor="ctr"/>
+          <a:lstStyle/>
+          <a:p>
+            <a:r>
+              <a:rPr lang="en-US" sz="1200" b="1" dirty="0" smtClean="0">
+                <a:solidFill>
+                  <a:schemeClr val="tx1"/>
+                </a:solidFill>
+              </a:rPr>
+              <a:t>&lt;select id="orderStatus" name="orderStatus" &gt; </a:t>
+            </a:r>
+          </a:p>
+          <a:p>
+            <a:r>
+              <a:rPr lang="en-US" sz="1200" b="1" dirty="0" smtClean="0">
+                <a:solidFill>
+                  <a:schemeClr val="tx1"/>
+                </a:solidFill>
+              </a:rPr>
+              <a:t>     &lt;option value="1"&gt;Received&lt;/option&gt;</a:t>
+            </a:r>
+          </a:p>
+          <a:p>
+            <a:r>
+              <a:rPr lang="en-US" sz="1200" b="1" dirty="0" smtClean="0">
+                <a:solidFill>
+                  <a:schemeClr val="tx1"/>
+                </a:solidFill>
+              </a:rPr>
+              <a:t>     &lt;option value="2"&gt;Sent&lt;/option&gt;</a:t>
+            </a:r>
+          </a:p>
+          <a:p>
+            <a:r>
+              <a:rPr lang="en-US" sz="1200" b="1" dirty="0" smtClean="0">
+                <a:solidFill>
+                  <a:schemeClr val="tx1"/>
+                </a:solidFill>
+              </a:rPr>
+              <a:t>     &lt;option value="3"&gt;Cancelled&lt;/option&gt;</a:t>
+            </a:r>
+          </a:p>
+          <a:p>
+            <a:r>
+              <a:rPr lang="en-US" sz="1200" b="1" dirty="0" smtClean="0">
+                <a:solidFill>
+                  <a:schemeClr val="tx1"/>
+                </a:solidFill>
+              </a:rPr>
+              <a:t>&lt;/select&gt; </a:t>
+            </a:r>
+          </a:p>
+        </p:txBody>
+      </p:sp>
+      <p:sp>
+        <p:nvSpPr>
+          <p:cNvPr id="43" name="正方形/長方形 42"/>
+          <p:cNvSpPr/>
+          <p:nvPr/>
+        </p:nvSpPr>
+        <p:spPr>
+          <a:xfrm>
+            <a:off x="5390532" y="5177144"/>
+            <a:ext cx="927065" cy="258271"/>
+          </a:xfrm>
+          <a:prstGeom prst="rect">
+            <a:avLst/>
+          </a:prstGeom>
+          <a:noFill/>
+          <a:ln>
+            <a:noFill/>
+          </a:ln>
+          <a:effectLst/>
+        </p:spPr>
+        <p:style>
+          <a:lnRef idx="1">
+            <a:schemeClr val="accent1"/>
+          </a:lnRef>
+          <a:fillRef idx="3">
+            <a:schemeClr val="accent1"/>
+          </a:fillRef>
+          <a:effectRef idx="2">
+            <a:schemeClr val="accent1"/>
+          </a:effectRef>
+          <a:fontRef idx="minor">
+            <a:schemeClr val="lt1"/>
+          </a:fontRef>
+        </p:style>
+        <p:txBody>
+          <a:bodyPr rtlCol="0" anchor="ctr"/>
+          <a:lstStyle/>
+          <a:p>
+            <a:r>
+              <a:rPr kumimoji="1" lang="en-US" altLang="ja-JP" sz="1600" b="1" dirty="0" smtClean="0">
+                <a:solidFill>
+                  <a:schemeClr val="tx1"/>
+                </a:solidFill>
+              </a:rPr>
+              <a:t>html</a:t>
+            </a:r>
+            <a:endParaRPr kumimoji="1" lang="ja-JP" altLang="en-US" sz="1600" dirty="0">
+              <a:solidFill>
+                <a:schemeClr val="accent2">
+                  <a:lumMod val="60000"/>
+                  <a:lumOff val="40000"/>
+                </a:schemeClr>
+              </a:solidFill>
+            </a:endParaRPr>
+          </a:p>
+        </p:txBody>
+      </p:sp>
+      <p:sp>
+        <p:nvSpPr>
+          <p:cNvPr id="46" name="正方形/長方形 45"/>
+          <p:cNvSpPr/>
+          <p:nvPr/>
+        </p:nvSpPr>
+        <p:spPr>
+          <a:xfrm>
+            <a:off x="5524501" y="4005131"/>
+            <a:ext cx="3510755" cy="855978"/>
+          </a:xfrm>
+          <a:prstGeom prst="rect">
+            <a:avLst/>
+          </a:prstGeom>
+          <a:noFill/>
+          <a:ln>
+            <a:solidFill>
+              <a:schemeClr val="tx1"/>
+            </a:solidFill>
+          </a:ln>
+          <a:effectLst/>
+        </p:spPr>
+        <p:style>
+          <a:lnRef idx="1">
+            <a:schemeClr val="accent1"/>
+          </a:lnRef>
+          <a:fillRef idx="3">
+            <a:schemeClr val="accent1"/>
+          </a:fillRef>
+          <a:effectRef idx="2">
+            <a:schemeClr val="accent1"/>
+          </a:effectRef>
+          <a:fontRef idx="minor">
+            <a:schemeClr val="lt1"/>
+          </a:fontRef>
+        </p:style>
+        <p:txBody>
+          <a:bodyPr rtlCol="0" anchor="ctr"/>
+          <a:lstStyle/>
+          <a:p>
+            <a:r>
+              <a:rPr lang="en-US" altLang="ja-JP" sz="1200" b="1" dirty="0" smtClean="0">
+                <a:solidFill>
+                  <a:schemeClr val="tx1"/>
+                </a:solidFill>
+              </a:rPr>
+              <a:t>&lt;form:select path="orderStatus“&gt;</a:t>
+            </a:r>
+          </a:p>
+          <a:p>
+            <a:r>
+              <a:rPr lang="en-US" altLang="ja-JP" sz="1200" b="1" dirty="0" smtClean="0">
+                <a:solidFill>
+                  <a:schemeClr val="tx1"/>
+                </a:solidFill>
+              </a:rPr>
+              <a:t>    &lt;form:options items="${</a:t>
+            </a:r>
+            <a:r>
+              <a:rPr lang="en-US" altLang="ja-JP" sz="1200" b="1" dirty="0" smtClean="0">
+                <a:solidFill>
+                  <a:schemeClr val="accent1"/>
+                </a:solidFill>
+              </a:rPr>
+              <a:t>CL_ORDERSTATUS</a:t>
+            </a:r>
+            <a:r>
+              <a:rPr lang="en-US" altLang="ja-JP" sz="1200" b="1" dirty="0" smtClean="0">
+                <a:solidFill>
+                  <a:schemeClr val="tx1"/>
+                </a:solidFill>
+              </a:rPr>
+              <a:t>}" /&gt;</a:t>
+            </a:r>
+          </a:p>
+          <a:p>
+            <a:r>
+              <a:rPr lang="en-US" altLang="ja-JP" sz="1200" b="1" dirty="0" smtClean="0">
+                <a:solidFill>
+                  <a:schemeClr val="tx1"/>
+                </a:solidFill>
+              </a:rPr>
+              <a:t>&lt;/form:select&gt;</a:t>
+            </a:r>
+          </a:p>
+        </p:txBody>
+      </p:sp>
+      <p:cxnSp>
+        <p:nvCxnSpPr>
+          <p:cNvPr id="47" name="カギ線コネクタ 46"/>
+          <p:cNvCxnSpPr>
+            <a:stCxn id="6" idx="3"/>
+          </p:cNvCxnSpPr>
+          <p:nvPr/>
+        </p:nvCxnSpPr>
+        <p:spPr>
+          <a:xfrm>
+            <a:off x="6286500" y="1953633"/>
+            <a:ext cx="1733550" cy="2361192"/>
+          </a:xfrm>
+          <a:prstGeom prst="bentConnector2">
+            <a:avLst/>
+          </a:prstGeom>
+          <a:ln>
+            <a:solidFill>
+              <a:srgbClr val="0070C0"/>
+            </a:solidFill>
+            <a:tailEnd type="arrow"/>
+          </a:ln>
+        </p:spPr>
+        <p:style>
+          <a:lnRef idx="2">
+            <a:schemeClr val="accent1"/>
+          </a:lnRef>
+          <a:fillRef idx="0">
+            <a:schemeClr val="accent1"/>
+          </a:fillRef>
+          <a:effectRef idx="1">
+            <a:schemeClr val="accent1"/>
+          </a:effectRef>
+          <a:fontRef idx="minor">
+            <a:schemeClr val="tx1"/>
+          </a:fontRef>
+        </p:style>
+      </p:cxnSp>
+      <p:sp>
+        <p:nvSpPr>
+          <p:cNvPr id="53" name="正方形/長方形 52"/>
+          <p:cNvSpPr/>
+          <p:nvPr/>
+        </p:nvSpPr>
+        <p:spPr>
+          <a:xfrm>
+            <a:off x="5348870" y="3774944"/>
+            <a:ext cx="937630" cy="182562"/>
+          </a:xfrm>
+          <a:prstGeom prst="rect">
+            <a:avLst/>
+          </a:prstGeom>
+          <a:noFill/>
+          <a:ln>
+            <a:noFill/>
+          </a:ln>
+          <a:effectLst/>
+        </p:spPr>
+        <p:style>
+          <a:lnRef idx="1">
+            <a:schemeClr val="accent1"/>
+          </a:lnRef>
+          <a:fillRef idx="3">
+            <a:schemeClr val="accent1"/>
+          </a:fillRef>
+          <a:effectRef idx="2">
+            <a:schemeClr val="accent1"/>
+          </a:effectRef>
+          <a:fontRef idx="minor">
+            <a:schemeClr val="lt1"/>
+          </a:fontRef>
+        </p:style>
+        <p:txBody>
+          <a:bodyPr rtlCol="0" anchor="ctr"/>
+          <a:lstStyle/>
+          <a:p>
+            <a:r>
+              <a:rPr kumimoji="1" lang="en-US" altLang="ja-JP" sz="1600" b="1" dirty="0" smtClean="0">
+                <a:solidFill>
+                  <a:schemeClr val="tx1"/>
+                </a:solidFill>
+              </a:rPr>
+              <a:t>JSP</a:t>
+            </a:r>
+            <a:endParaRPr kumimoji="1" lang="ja-JP" altLang="en-US" sz="1600" dirty="0">
+              <a:solidFill>
+                <a:schemeClr val="accent2">
+                  <a:lumMod val="60000"/>
+                  <a:lumOff val="40000"/>
+                </a:schemeClr>
+              </a:solidFill>
+            </a:endParaRPr>
+          </a:p>
+        </p:txBody>
+      </p:sp>
+      <p:sp>
+        <p:nvSpPr>
+          <p:cNvPr id="55" name="右矢印 54"/>
+          <p:cNvSpPr/>
+          <p:nvPr/>
+        </p:nvSpPr>
+        <p:spPr>
+          <a:xfrm rot="10800000">
+            <a:off x="4144119" y="6005666"/>
+            <a:ext cx="1246413" cy="419098"/>
+          </a:xfrm>
+          <a:prstGeom prst="rightArrow">
+            <a:avLst/>
+          </a:prstGeom>
+        </p:spPr>
+        <p:style>
+          <a:lnRef idx="1">
+            <a:schemeClr val="accent1"/>
+          </a:lnRef>
+          <a:fillRef idx="3">
+            <a:schemeClr val="accent1"/>
+          </a:fillRef>
+          <a:effectRef idx="2">
+            <a:schemeClr val="accent1"/>
+          </a:effectRef>
+          <a:fontRef idx="minor">
+            <a:schemeClr val="lt1"/>
+          </a:fontRef>
+        </p:style>
+        <p:txBody>
+          <a:bodyPr rtlCol="0" anchor="ctr"/>
+          <a:lstStyle/>
+          <a:p>
+            <a:pPr algn="ctr"/>
+            <a:endParaRPr kumimoji="1" lang="ja-JP" altLang="en-US" dirty="0"/>
+          </a:p>
+        </p:txBody>
+      </p:sp>
+      <p:sp>
+        <p:nvSpPr>
+          <p:cNvPr id="56" name="正方形/長方形 55"/>
+          <p:cNvSpPr/>
+          <p:nvPr/>
+        </p:nvSpPr>
+        <p:spPr>
+          <a:xfrm>
+            <a:off x="1651331" y="5600700"/>
+            <a:ext cx="1211442" cy="288433"/>
+          </a:xfrm>
+          <a:prstGeom prst="rect">
+            <a:avLst/>
+          </a:prstGeom>
+          <a:noFill/>
+          <a:ln>
+            <a:noFill/>
+          </a:ln>
+          <a:effectLst/>
+        </p:spPr>
+        <p:style>
+          <a:lnRef idx="1">
+            <a:schemeClr val="accent1"/>
+          </a:lnRef>
+          <a:fillRef idx="3">
+            <a:schemeClr val="accent1"/>
+          </a:fillRef>
+          <a:effectRef idx="2">
+            <a:schemeClr val="accent1"/>
+          </a:effectRef>
+          <a:fontRef idx="minor">
+            <a:schemeClr val="lt1"/>
+          </a:fontRef>
+        </p:style>
+        <p:txBody>
+          <a:bodyPr rtlCol="0" anchor="ctr"/>
+          <a:lstStyle/>
+          <a:p>
+            <a:r>
+              <a:rPr lang="en-US" altLang="ja-JP" sz="1600" b="1" dirty="0" smtClean="0">
+                <a:solidFill>
+                  <a:schemeClr val="tx1"/>
+                </a:solidFill>
+              </a:rPr>
+              <a:t>Browser</a:t>
+            </a:r>
+            <a:endParaRPr kumimoji="1" lang="ja-JP" altLang="en-US" sz="1600" dirty="0">
+              <a:solidFill>
+                <a:schemeClr val="accent2">
+                  <a:lumMod val="60000"/>
+                  <a:lumOff val="40000"/>
+                </a:schemeClr>
+              </a:solidFill>
+            </a:endParaRPr>
+          </a:p>
+        </p:txBody>
+      </p:sp>
+      <p:pic>
+        <p:nvPicPr>
+          <p:cNvPr id="57" name="Picture 3"/>
+          <p:cNvPicPr>
+            <a:picLocks noChangeAspect="1" noChangeArrowheads="1"/>
+          </p:cNvPicPr>
+          <p:nvPr/>
+        </p:nvPicPr>
+        <p:blipFill>
+          <a:blip r:embed="rId2"/>
+          <a:srcRect/>
+          <a:stretch>
+            <a:fillRect/>
+          </a:stretch>
+        </p:blipFill>
+        <p:spPr bwMode="auto">
+          <a:xfrm>
+            <a:off x="1800736" y="5837242"/>
+            <a:ext cx="2219325" cy="895350"/>
+          </a:xfrm>
+          <a:prstGeom prst="rect">
+            <a:avLst/>
+          </a:prstGeom>
+          <a:noFill/>
+          <a:ln w="9525">
+            <a:noFill/>
+            <a:miter lim="800000"/>
+            <a:headEnd/>
+            <a:tailEnd/>
+          </a:ln>
+          <a:effectLst/>
+        </p:spPr>
+      </p:pic>
+      <p:sp>
+        <p:nvSpPr>
+          <p:cNvPr id="62" name="右矢印 61"/>
+          <p:cNvSpPr/>
+          <p:nvPr/>
+        </p:nvSpPr>
+        <p:spPr>
+          <a:xfrm rot="5400000">
+            <a:off x="7033660" y="4982623"/>
+            <a:ext cx="486486" cy="419098"/>
+          </a:xfrm>
+          <a:prstGeom prst="rightArrow">
+            <a:avLst/>
+          </a:prstGeom>
+        </p:spPr>
+        <p:style>
+          <a:lnRef idx="1">
+            <a:schemeClr val="accent1"/>
+          </a:lnRef>
+          <a:fillRef idx="3">
+            <a:schemeClr val="accent1"/>
+          </a:fillRef>
+          <a:effectRef idx="2">
+            <a:schemeClr val="accent1"/>
+          </a:effectRef>
+          <a:fontRef idx="minor">
+            <a:schemeClr val="lt1"/>
+          </a:fontRef>
+        </p:style>
+        <p:txBody>
+          <a:bodyPr rtlCol="0" anchor="ctr"/>
+          <a:lstStyle/>
+          <a:p>
+            <a:pPr algn="ctr"/>
+            <a:endParaRPr kumimoji="1" lang="ja-JP" altLang="en-US" dirty="0"/>
+          </a:p>
+        </p:txBody>
+      </p:sp>
+      <p:sp>
+        <p:nvSpPr>
+          <p:cNvPr id="63" name="正方形/長方形 62"/>
+          <p:cNvSpPr/>
+          <p:nvPr/>
+        </p:nvSpPr>
+        <p:spPr>
+          <a:xfrm>
+            <a:off x="1290639" y="2372571"/>
+            <a:ext cx="1938336" cy="962024"/>
+          </a:xfrm>
+          <a:prstGeom prst="rect">
+            <a:avLst/>
+          </a:prstGeom>
+          <a:noFill/>
+          <a:ln w="31750">
+            <a:solidFill>
+              <a:srgbClr val="C00000"/>
+            </a:solidFill>
+            <a:prstDash val="sysDash"/>
+          </a:ln>
+        </p:spPr>
+        <p:style>
+          <a:lnRef idx="1">
+            <a:schemeClr val="accent1"/>
+          </a:lnRef>
+          <a:fillRef idx="3">
+            <a:schemeClr val="accent1"/>
+          </a:fillRef>
+          <a:effectRef idx="2">
+            <a:schemeClr val="accent1"/>
+          </a:effectRef>
+          <a:fontRef idx="minor">
+            <a:schemeClr val="lt1"/>
+          </a:fontRef>
+        </p:style>
+        <p:txBody>
+          <a:bodyPr rtlCol="0" anchor="ctr"/>
+          <a:lstStyle/>
+          <a:p>
+            <a:pPr algn="ctr"/>
+            <a:endParaRPr kumimoji="1" lang="ja-JP" altLang="en-US" dirty="0"/>
+          </a:p>
+        </p:txBody>
+      </p:sp>
+      <p:sp>
+        <p:nvSpPr>
+          <p:cNvPr id="64" name="正方形/長方形 63"/>
+          <p:cNvSpPr/>
+          <p:nvPr/>
+        </p:nvSpPr>
+        <p:spPr>
+          <a:xfrm>
+            <a:off x="3766741" y="2372570"/>
+            <a:ext cx="2253059" cy="962025"/>
+          </a:xfrm>
+          <a:prstGeom prst="rect">
+            <a:avLst/>
+          </a:prstGeom>
+          <a:noFill/>
+          <a:ln w="31750">
+            <a:solidFill>
+              <a:srgbClr val="C00000"/>
+            </a:solidFill>
+            <a:prstDash val="sysDash"/>
+          </a:ln>
+        </p:spPr>
+        <p:style>
+          <a:lnRef idx="1">
+            <a:schemeClr val="accent1"/>
+          </a:lnRef>
+          <a:fillRef idx="3">
+            <a:schemeClr val="accent1"/>
+          </a:fillRef>
+          <a:effectRef idx="2">
+            <a:schemeClr val="accent1"/>
+          </a:effectRef>
+          <a:fontRef idx="minor">
+            <a:schemeClr val="lt1"/>
+          </a:fontRef>
+        </p:style>
+        <p:txBody>
+          <a:bodyPr rtlCol="0" anchor="ctr"/>
+          <a:lstStyle/>
+          <a:p>
+            <a:pPr algn="ctr"/>
+            <a:endParaRPr kumimoji="1" lang="ja-JP" altLang="en-US" dirty="0"/>
+          </a:p>
+        </p:txBody>
+      </p:sp>
+      <p:sp>
+        <p:nvSpPr>
+          <p:cNvPr id="65" name="正方形/長方形 64"/>
+          <p:cNvSpPr/>
+          <p:nvPr/>
+        </p:nvSpPr>
+        <p:spPr>
+          <a:xfrm>
+            <a:off x="5759682" y="5572125"/>
+            <a:ext cx="2643127" cy="838200"/>
+          </a:xfrm>
+          <a:prstGeom prst="rect">
+            <a:avLst/>
+          </a:prstGeom>
+          <a:noFill/>
+          <a:ln w="31750">
+            <a:solidFill>
+              <a:srgbClr val="C00000"/>
+            </a:solidFill>
+            <a:prstDash val="sysDash"/>
+          </a:ln>
+        </p:spPr>
+        <p:style>
+          <a:lnRef idx="1">
+            <a:schemeClr val="accent1"/>
+          </a:lnRef>
+          <a:fillRef idx="3">
+            <a:schemeClr val="accent1"/>
+          </a:fillRef>
+          <a:effectRef idx="2">
+            <a:schemeClr val="accent1"/>
+          </a:effectRef>
+          <a:fontRef idx="minor">
+            <a:schemeClr val="lt1"/>
+          </a:fontRef>
+        </p:style>
+        <p:txBody>
+          <a:bodyPr rtlCol="0" anchor="ctr"/>
+          <a:lstStyle/>
+          <a:p>
+            <a:pPr algn="ctr"/>
+            <a:endParaRPr kumimoji="1" lang="ja-JP" altLang="en-US" dirty="0"/>
+          </a:p>
+        </p:txBody>
+      </p:sp>
+      <p:sp>
+        <p:nvSpPr>
+          <p:cNvPr id="67" name="正方形/長方形 66"/>
+          <p:cNvSpPr/>
+          <p:nvPr/>
+        </p:nvSpPr>
+        <p:spPr>
+          <a:xfrm>
+            <a:off x="4090277" y="2439925"/>
+            <a:ext cx="525558" cy="817623"/>
+          </a:xfrm>
+          <a:prstGeom prst="rect">
+            <a:avLst/>
+          </a:prstGeom>
+          <a:noFill/>
+          <a:ln w="31750">
+            <a:solidFill>
+              <a:srgbClr val="00B050"/>
+            </a:solidFill>
+            <a:prstDash val="sysDash"/>
+          </a:ln>
+        </p:spPr>
+        <p:style>
+          <a:lnRef idx="1">
+            <a:schemeClr val="accent1"/>
+          </a:lnRef>
+          <a:fillRef idx="3">
+            <a:schemeClr val="accent1"/>
+          </a:fillRef>
+          <a:effectRef idx="2">
+            <a:schemeClr val="accent1"/>
+          </a:effectRef>
+          <a:fontRef idx="minor">
+            <a:schemeClr val="lt1"/>
+          </a:fontRef>
+        </p:style>
+        <p:txBody>
+          <a:bodyPr rtlCol="0" anchor="ctr"/>
+          <a:lstStyle/>
+          <a:p>
+            <a:pPr algn="ctr"/>
+            <a:endParaRPr kumimoji="1" lang="ja-JP" altLang="en-US" dirty="0"/>
+          </a:p>
+        </p:txBody>
+      </p:sp>
+      <p:sp>
+        <p:nvSpPr>
+          <p:cNvPr id="68" name="正方形/長方形 67"/>
+          <p:cNvSpPr/>
+          <p:nvPr/>
+        </p:nvSpPr>
+        <p:spPr>
+          <a:xfrm>
+            <a:off x="4933951" y="2439925"/>
+            <a:ext cx="913162" cy="817623"/>
+          </a:xfrm>
+          <a:prstGeom prst="rect">
+            <a:avLst/>
+          </a:prstGeom>
+          <a:noFill/>
+          <a:ln w="31750">
+            <a:solidFill>
+              <a:srgbClr val="FFC000"/>
+            </a:solidFill>
+            <a:prstDash val="sysDash"/>
+          </a:ln>
+        </p:spPr>
+        <p:style>
+          <a:lnRef idx="1">
+            <a:schemeClr val="accent1"/>
+          </a:lnRef>
+          <a:fillRef idx="3">
+            <a:schemeClr val="accent1"/>
+          </a:fillRef>
+          <a:effectRef idx="2">
+            <a:schemeClr val="accent1"/>
+          </a:effectRef>
+          <a:fontRef idx="minor">
+            <a:schemeClr val="lt1"/>
+          </a:fontRef>
+        </p:style>
+        <p:txBody>
+          <a:bodyPr rtlCol="0" anchor="ctr"/>
+          <a:lstStyle/>
+          <a:p>
+            <a:pPr algn="ctr"/>
+            <a:endParaRPr kumimoji="1" lang="ja-JP" altLang="en-US" dirty="0"/>
+          </a:p>
+        </p:txBody>
+      </p:sp>
+      <p:sp>
+        <p:nvSpPr>
+          <p:cNvPr id="69" name="正方形/長方形 68"/>
+          <p:cNvSpPr/>
+          <p:nvPr/>
+        </p:nvSpPr>
+        <p:spPr>
+          <a:xfrm>
+            <a:off x="280277" y="4180596"/>
+            <a:ext cx="1762327" cy="420777"/>
+          </a:xfrm>
+          <a:prstGeom prst="rect">
+            <a:avLst/>
+          </a:prstGeom>
+          <a:noFill/>
+          <a:ln w="31750">
+            <a:solidFill>
+              <a:srgbClr val="00B050"/>
+            </a:solidFill>
+            <a:prstDash val="sysDash"/>
+          </a:ln>
+        </p:spPr>
+        <p:style>
+          <a:lnRef idx="1">
+            <a:schemeClr val="accent1"/>
+          </a:lnRef>
+          <a:fillRef idx="3">
+            <a:schemeClr val="accent1"/>
+          </a:fillRef>
+          <a:effectRef idx="2">
+            <a:schemeClr val="accent1"/>
+          </a:effectRef>
+          <a:fontRef idx="minor">
+            <a:schemeClr val="lt1"/>
+          </a:fontRef>
+        </p:style>
+        <p:txBody>
+          <a:bodyPr rtlCol="0" anchor="ctr"/>
+          <a:lstStyle/>
+          <a:p>
+            <a:pPr algn="ctr"/>
+            <a:endParaRPr kumimoji="1" lang="ja-JP" altLang="en-US" dirty="0"/>
+          </a:p>
+        </p:txBody>
+      </p:sp>
+      <p:sp>
+        <p:nvSpPr>
+          <p:cNvPr id="70" name="正方形/長方形 69"/>
+          <p:cNvSpPr/>
+          <p:nvPr/>
+        </p:nvSpPr>
+        <p:spPr>
+          <a:xfrm>
+            <a:off x="265685" y="4812406"/>
+            <a:ext cx="1776919" cy="435870"/>
+          </a:xfrm>
+          <a:prstGeom prst="rect">
+            <a:avLst/>
+          </a:prstGeom>
+          <a:noFill/>
+          <a:ln w="31750">
+            <a:solidFill>
+              <a:srgbClr val="FFC000"/>
+            </a:solidFill>
+            <a:prstDash val="sysDash"/>
+          </a:ln>
+        </p:spPr>
+        <p:style>
+          <a:lnRef idx="1">
+            <a:schemeClr val="accent1"/>
+          </a:lnRef>
+          <a:fillRef idx="3">
+            <a:schemeClr val="accent1"/>
+          </a:fillRef>
+          <a:effectRef idx="2">
+            <a:schemeClr val="accent1"/>
+          </a:effectRef>
+          <a:fontRef idx="minor">
+            <a:schemeClr val="lt1"/>
+          </a:fontRef>
+        </p:style>
+        <p:txBody>
+          <a:bodyPr rtlCol="0" anchor="ctr"/>
+          <a:lstStyle/>
+          <a:p>
+            <a:pPr algn="ctr"/>
+            <a:endParaRPr kumimoji="1" lang="ja-JP" altLang="en-US" dirty="0"/>
+          </a:p>
+        </p:txBody>
+      </p:sp>
+      <p:cxnSp>
+        <p:nvCxnSpPr>
+          <p:cNvPr id="74" name="図形 16"/>
+          <p:cNvCxnSpPr>
+            <a:stCxn id="69" idx="3"/>
+            <a:endCxn id="67" idx="2"/>
+          </p:cNvCxnSpPr>
+          <p:nvPr/>
+        </p:nvCxnSpPr>
+        <p:spPr>
+          <a:xfrm flipV="1">
+            <a:off x="2042604" y="3257548"/>
+            <a:ext cx="2310452" cy="1133437"/>
+          </a:xfrm>
+          <a:prstGeom prst="curvedConnector2">
+            <a:avLst/>
+          </a:prstGeom>
+          <a:ln>
+            <a:solidFill>
+              <a:srgbClr val="00B050"/>
+            </a:solidFill>
+            <a:tailEnd type="arrow"/>
+          </a:ln>
+        </p:spPr>
+        <p:style>
+          <a:lnRef idx="2">
+            <a:schemeClr val="accent1"/>
+          </a:lnRef>
+          <a:fillRef idx="0">
+            <a:schemeClr val="accent1"/>
+          </a:fillRef>
+          <a:effectRef idx="1">
+            <a:schemeClr val="accent1"/>
+          </a:effectRef>
+          <a:fontRef idx="minor">
+            <a:schemeClr val="tx1"/>
+          </a:fontRef>
+        </p:style>
+      </p:cxnSp>
+      <p:cxnSp>
+        <p:nvCxnSpPr>
+          <p:cNvPr id="78" name="図形 90"/>
+          <p:cNvCxnSpPr>
+            <a:stCxn id="70" idx="3"/>
+            <a:endCxn id="68" idx="2"/>
+          </p:cNvCxnSpPr>
+          <p:nvPr/>
+        </p:nvCxnSpPr>
+        <p:spPr>
+          <a:xfrm flipV="1">
+            <a:off x="2042604" y="3257548"/>
+            <a:ext cx="3347928" cy="1772793"/>
+          </a:xfrm>
+          <a:prstGeom prst="curvedConnector2">
+            <a:avLst/>
+          </a:prstGeom>
+          <a:ln>
+            <a:solidFill>
+              <a:srgbClr val="FFC000"/>
+            </a:solidFill>
+            <a:tailEnd type="arrow"/>
+          </a:ln>
+        </p:spPr>
+        <p:style>
+          <a:lnRef idx="2">
+            <a:schemeClr val="accent1"/>
+          </a:lnRef>
+          <a:fillRef idx="0">
+            <a:schemeClr val="accent1"/>
+          </a:fillRef>
+          <a:effectRef idx="1">
+            <a:schemeClr val="accent1"/>
+          </a:effectRef>
+          <a:fontRef idx="minor">
+            <a:schemeClr val="tx1"/>
+          </a:fontRef>
+        </p:style>
+      </p:cxnSp>
+      <p:cxnSp>
+        <p:nvCxnSpPr>
+          <p:cNvPr id="88" name="直線コネクタ 87"/>
+          <p:cNvCxnSpPr>
+            <a:stCxn id="63" idx="3"/>
+            <a:endCxn id="64" idx="1"/>
+          </p:cNvCxnSpPr>
+          <p:nvPr/>
+        </p:nvCxnSpPr>
+        <p:spPr>
+          <a:xfrm>
+            <a:off x="3228975" y="2853583"/>
+            <a:ext cx="537766" cy="0"/>
+          </a:xfrm>
+          <a:prstGeom prst="straightConnector1">
+            <a:avLst/>
+          </a:prstGeom>
+          <a:ln>
+            <a:solidFill>
+              <a:srgbClr val="C00000"/>
+            </a:solidFill>
+            <a:tailEnd type="arrow"/>
+          </a:ln>
+        </p:spPr>
+        <p:style>
+          <a:lnRef idx="2">
+            <a:schemeClr val="accent1"/>
+          </a:lnRef>
+          <a:fillRef idx="0">
+            <a:schemeClr val="accent1"/>
+          </a:fillRef>
+          <a:effectRef idx="1">
+            <a:schemeClr val="accent1"/>
+          </a:effectRef>
+          <a:fontRef idx="minor">
+            <a:schemeClr val="tx1"/>
+          </a:fontRef>
+        </p:style>
+      </p:cxnSp>
+      <p:cxnSp>
+        <p:nvCxnSpPr>
+          <p:cNvPr id="115" name="直線コネクタ 87"/>
+          <p:cNvCxnSpPr>
+            <a:stCxn id="64" idx="3"/>
+          </p:cNvCxnSpPr>
+          <p:nvPr/>
+        </p:nvCxnSpPr>
+        <p:spPr>
+          <a:xfrm>
+            <a:off x="6019800" y="2853583"/>
+            <a:ext cx="666750" cy="2718542"/>
+          </a:xfrm>
+          <a:prstGeom prst="bentConnector2">
+            <a:avLst/>
+          </a:prstGeom>
+          <a:ln>
+            <a:solidFill>
+              <a:srgbClr val="C00000"/>
+            </a:solidFill>
+            <a:tailEnd type="arrow"/>
+          </a:ln>
+        </p:spPr>
+        <p:style>
+          <a:lnRef idx="2">
+            <a:schemeClr val="accent1"/>
+          </a:lnRef>
+          <a:fillRef idx="0">
+            <a:schemeClr val="accent1"/>
+          </a:fillRef>
+          <a:effectRef idx="1">
+            <a:schemeClr val="accent1"/>
+          </a:effectRef>
+          <a:fontRef idx="minor">
+            <a:schemeClr val="tx1"/>
+          </a:fontRef>
+        </p:style>
+      </p:cxnSp>
+      <p:sp>
+        <p:nvSpPr>
+          <p:cNvPr id="118" name="正方形/長方形 117"/>
+          <p:cNvSpPr/>
+          <p:nvPr/>
+        </p:nvSpPr>
+        <p:spPr>
+          <a:xfrm>
+            <a:off x="-9524" y="1537436"/>
+            <a:ext cx="733424" cy="267868"/>
+          </a:xfrm>
+          <a:prstGeom prst="rect">
+            <a:avLst/>
+          </a:prstGeom>
+          <a:noFill/>
+          <a:ln>
+            <a:noFill/>
+          </a:ln>
+          <a:effectLst/>
+        </p:spPr>
+        <p:style>
+          <a:lnRef idx="1">
+            <a:schemeClr val="accent1"/>
+          </a:lnRef>
+          <a:fillRef idx="3">
+            <a:schemeClr val="accent1"/>
+          </a:fillRef>
+          <a:effectRef idx="2">
+            <a:schemeClr val="accent1"/>
+          </a:effectRef>
+          <a:fontRef idx="minor">
+            <a:schemeClr val="lt1"/>
+          </a:fontRef>
+        </p:style>
+        <p:txBody>
+          <a:bodyPr rtlCol="0" anchor="ctr"/>
+          <a:lstStyle/>
+          <a:p>
+            <a:r>
+              <a:rPr kumimoji="1" lang="en-US" altLang="ja-JP" sz="1600" b="1" dirty="0" err="1" smtClean="0">
+                <a:solidFill>
+                  <a:schemeClr val="tx1"/>
+                </a:solidFill>
+              </a:rPr>
+              <a:t>Enum</a:t>
+            </a:r>
+            <a:endParaRPr kumimoji="1" lang="ja-JP" altLang="en-US" sz="1600" dirty="0">
+              <a:solidFill>
+                <a:schemeClr val="accent2">
+                  <a:lumMod val="60000"/>
+                  <a:lumOff val="40000"/>
+                </a:schemeClr>
+              </a:solidFill>
+            </a:endParaRPr>
+          </a:p>
+        </p:txBody>
+      </p:sp>
+      <p:cxnSp>
+        <p:nvCxnSpPr>
+          <p:cNvPr id="119" name="カギ線コネクタ 118"/>
+          <p:cNvCxnSpPr>
+            <a:endCxn id="2" idx="0"/>
+          </p:cNvCxnSpPr>
+          <p:nvPr/>
+        </p:nvCxnSpPr>
+        <p:spPr>
+          <a:xfrm flipH="1">
+            <a:off x="1781686" y="1019175"/>
+            <a:ext cx="790065" cy="776603"/>
+          </a:xfrm>
+          <a:prstGeom prst="straightConnector1">
+            <a:avLst/>
+          </a:prstGeom>
+          <a:ln w="38100">
+            <a:solidFill>
+              <a:schemeClr val="tx1">
+                <a:lumMod val="50000"/>
+                <a:lumOff val="50000"/>
+              </a:schemeClr>
+            </a:solidFill>
+            <a:tailEnd type="arrow"/>
+          </a:ln>
+        </p:spPr>
+        <p:style>
+          <a:lnRef idx="1">
+            <a:schemeClr val="dk1"/>
+          </a:lnRef>
+          <a:fillRef idx="0">
+            <a:schemeClr val="dk1"/>
+          </a:fillRef>
+          <a:effectRef idx="0">
+            <a:schemeClr val="dk1"/>
+          </a:effectRef>
+          <a:fontRef idx="minor">
+            <a:schemeClr val="tx1"/>
+          </a:fontRef>
+        </p:style>
+      </p:cxnSp>
+      <p:sp>
+        <p:nvSpPr>
+          <p:cNvPr id="143" name="正方形/長方形 142"/>
+          <p:cNvSpPr/>
+          <p:nvPr/>
+        </p:nvSpPr>
+        <p:spPr>
+          <a:xfrm>
+            <a:off x="1417127" y="2453391"/>
+            <a:ext cx="412184" cy="785107"/>
+          </a:xfrm>
+          <a:prstGeom prst="rect">
+            <a:avLst/>
+          </a:prstGeom>
+          <a:noFill/>
+          <a:ln w="31750">
+            <a:solidFill>
+              <a:srgbClr val="00B050"/>
+            </a:solidFill>
+            <a:prstDash val="sysDash"/>
+          </a:ln>
+        </p:spPr>
+        <p:style>
+          <a:lnRef idx="1">
+            <a:schemeClr val="accent1"/>
+          </a:lnRef>
+          <a:fillRef idx="3">
+            <a:schemeClr val="accent1"/>
+          </a:fillRef>
+          <a:effectRef idx="2">
+            <a:schemeClr val="accent1"/>
+          </a:effectRef>
+          <a:fontRef idx="minor">
+            <a:schemeClr val="lt1"/>
+          </a:fontRef>
+        </p:style>
+        <p:txBody>
+          <a:bodyPr rtlCol="0" anchor="ctr"/>
+          <a:lstStyle/>
+          <a:p>
+            <a:pPr algn="ctr"/>
+            <a:endParaRPr kumimoji="1" lang="ja-JP" altLang="en-US" dirty="0"/>
+          </a:p>
+        </p:txBody>
+      </p:sp>
+      <p:sp>
+        <p:nvSpPr>
+          <p:cNvPr id="144" name="正方形/長方形 143"/>
+          <p:cNvSpPr/>
+          <p:nvPr/>
+        </p:nvSpPr>
+        <p:spPr>
+          <a:xfrm>
+            <a:off x="1949611" y="2458975"/>
+            <a:ext cx="1146014" cy="779523"/>
+          </a:xfrm>
+          <a:prstGeom prst="rect">
+            <a:avLst/>
+          </a:prstGeom>
+          <a:noFill/>
+          <a:ln w="31750">
+            <a:solidFill>
+              <a:srgbClr val="FFC000"/>
+            </a:solidFill>
+            <a:prstDash val="sysDash"/>
+          </a:ln>
+        </p:spPr>
+        <p:style>
+          <a:lnRef idx="1">
+            <a:schemeClr val="accent1"/>
+          </a:lnRef>
+          <a:fillRef idx="3">
+            <a:schemeClr val="accent1"/>
+          </a:fillRef>
+          <a:effectRef idx="2">
+            <a:schemeClr val="accent1"/>
+          </a:effectRef>
+          <a:fontRef idx="minor">
+            <a:schemeClr val="lt1"/>
+          </a:fontRef>
+        </p:style>
+        <p:txBody>
+          <a:bodyPr rtlCol="0" anchor="ctr"/>
+          <a:lstStyle/>
+          <a:p>
+            <a:pPr algn="ctr"/>
+            <a:endParaRPr kumimoji="1" lang="ja-JP" altLang="en-US" dirty="0"/>
+          </a:p>
+        </p:txBody>
+      </p:sp>
+      <p:sp>
+        <p:nvSpPr>
+          <p:cNvPr id="149" name="正方形/長方形 148"/>
+          <p:cNvSpPr/>
+          <p:nvPr/>
+        </p:nvSpPr>
+        <p:spPr>
+          <a:xfrm>
+            <a:off x="5854064" y="5730146"/>
+            <a:ext cx="1176016" cy="595890"/>
+          </a:xfrm>
+          <a:prstGeom prst="rect">
+            <a:avLst/>
+          </a:prstGeom>
+          <a:noFill/>
+          <a:ln w="31750">
+            <a:solidFill>
+              <a:srgbClr val="00B050"/>
+            </a:solidFill>
+            <a:prstDash val="sysDash"/>
+          </a:ln>
+        </p:spPr>
+        <p:style>
+          <a:lnRef idx="1">
+            <a:schemeClr val="accent1"/>
+          </a:lnRef>
+          <a:fillRef idx="3">
+            <a:schemeClr val="accent1"/>
+          </a:fillRef>
+          <a:effectRef idx="2">
+            <a:schemeClr val="accent1"/>
+          </a:effectRef>
+          <a:fontRef idx="minor">
+            <a:schemeClr val="lt1"/>
+          </a:fontRef>
+        </p:style>
+        <p:txBody>
+          <a:bodyPr rtlCol="0" anchor="ctr"/>
+          <a:lstStyle/>
+          <a:p>
+            <a:pPr algn="ctr"/>
+            <a:endParaRPr kumimoji="1" lang="ja-JP" altLang="en-US" dirty="0"/>
+          </a:p>
+        </p:txBody>
+      </p:sp>
+      <p:sp>
+        <p:nvSpPr>
+          <p:cNvPr id="151" name="正方形/長方形 150"/>
+          <p:cNvSpPr/>
+          <p:nvPr/>
+        </p:nvSpPr>
+        <p:spPr>
+          <a:xfrm>
+            <a:off x="7067354" y="5706815"/>
+            <a:ext cx="1219396" cy="619222"/>
+          </a:xfrm>
+          <a:prstGeom prst="rect">
+            <a:avLst/>
+          </a:prstGeom>
+          <a:noFill/>
+          <a:ln w="31750">
+            <a:solidFill>
+              <a:srgbClr val="FFC000"/>
+            </a:solidFill>
+            <a:prstDash val="sysDash"/>
+          </a:ln>
+        </p:spPr>
+        <p:style>
+          <a:lnRef idx="1">
+            <a:schemeClr val="accent1"/>
+          </a:lnRef>
+          <a:fillRef idx="3">
+            <a:schemeClr val="accent1"/>
+          </a:fillRef>
+          <a:effectRef idx="2">
+            <a:schemeClr val="accent1"/>
+          </a:effectRef>
+          <a:fontRef idx="minor">
+            <a:schemeClr val="lt1"/>
+          </a:fontRef>
+        </p:style>
+        <p:txBody>
+          <a:bodyPr rtlCol="0" anchor="ctr"/>
+          <a:lstStyle/>
+          <a:p>
+            <a:pPr algn="ctr"/>
+            <a:endParaRPr kumimoji="1" lang="ja-JP" altLang="en-US" dirty="0"/>
+          </a:p>
+        </p:txBody>
+      </p:sp>
+      <p:cxnSp>
+        <p:nvCxnSpPr>
+          <p:cNvPr id="152" name="カギ線コネクタ 151"/>
+          <p:cNvCxnSpPr/>
+          <p:nvPr/>
+        </p:nvCxnSpPr>
+        <p:spPr>
+          <a:xfrm>
+            <a:off x="2176718" y="487544"/>
+            <a:ext cx="3425117" cy="1285275"/>
+          </a:xfrm>
+          <a:prstGeom prst="bentConnector3">
+            <a:avLst>
+              <a:gd name="adj1" fmla="val 100057"/>
+            </a:avLst>
+          </a:prstGeom>
+          <a:ln>
+            <a:solidFill>
+              <a:srgbClr val="0070C0"/>
+            </a:solidFill>
+            <a:tailEnd type="arrow"/>
+          </a:ln>
+        </p:spPr>
+        <p:style>
+          <a:lnRef idx="2">
+            <a:schemeClr val="accent1"/>
+          </a:lnRef>
+          <a:fillRef idx="0">
+            <a:schemeClr val="accent1"/>
+          </a:fillRef>
+          <a:effectRef idx="1">
+            <a:schemeClr val="accent1"/>
+          </a:effectRef>
+          <a:fontRef idx="minor">
+            <a:schemeClr val="tx1"/>
+          </a:fontRef>
+        </p:style>
+      </p:cxnSp>
+    </p:spTree>
+    <p:extLst>
+      <p:ext uri="{BB962C8B-B14F-4D97-AF65-F5344CB8AC3E}">
+        <p14:creationId xmlns:p14="http://schemas.microsoft.com/office/powerpoint/2010/main" val="1577533250"/>
+      </p:ext>
+    </p:extLst>
+  </p:cSld>
+  <p:clrMapOvr>
+    <a:masterClrMapping/>
+  </p:clrMapOvr>
+  <p:timing>
+    <p:tnLst>
+      <p:par>
+        <p:cTn id="1" dur="indefinite" restart="never" nodeType="tmRoot"/>
+      </p:par>
+    </p:tnLst>
+  </p:timing>
+</p:sld>
+</file>
+
+<file path=ppt/slides/slide4.xml><?xml version="1.0" encoding="utf-8"?>
 <p:sld xmlns:a="http://schemas.openxmlformats.org/drawingml/2006/main" xmlns:r="http://schemas.openxmlformats.org/officeDocument/2006/relationships" xmlns:p="http://schemas.openxmlformats.org/presentationml/2006/main">
   <p:cSld>
     <p:spTree>
@@ -9800,10 +11872,17 @@
   <p:clrMapOvr>
     <a:masterClrMapping/>
   </p:clrMapOvr>
+  <p:timing>
+    <p:tnLst>
+      <p:par>
+        <p:cTn id="1" dur="indefinite" restart="never" nodeType="tmRoot"/>
+      </p:par>
+    </p:tnLst>
+  </p:timing>
 </p:sld>
 </file>
 
-<file path=ppt/slides/slide4.xml><?xml version="1.0" encoding="utf-8"?>
+<file path=ppt/slides/slide5.xml><?xml version="1.0" encoding="utf-8"?>
 <p:sld xmlns:a="http://schemas.openxmlformats.org/drawingml/2006/main" xmlns:r="http://schemas.openxmlformats.org/officeDocument/2006/relationships" xmlns:p="http://schemas.openxmlformats.org/presentationml/2006/main">
   <p:cSld>
     <p:spTree>
@@ -10629,15 +12708,7 @@
                             <a:schemeClr val="tx1"/>
                           </a:solidFill>
                         </a:rPr>
-                        <a:t>than </a:t>
-                      </a:r>
-                      <a:r>
-                        <a:rPr lang="en-US" altLang="ja-JP" sz="800" i="1" smtClean="0">
-                          <a:solidFill>
-                            <a:schemeClr val="tx1"/>
-                          </a:solidFill>
-                        </a:rPr>
-                        <a:t>\10,000</a:t>
+                        <a:t>than \10,000</a:t>
                       </a:r>
                       <a:endParaRPr kumimoji="1" lang="ja-JP" altLang="en-US" sz="800" dirty="0"/>
                     </a:p>
@@ -11847,6 +13918,13 @@
   <p:clrMapOvr>
     <a:masterClrMapping/>
   </p:clrMapOvr>
+  <p:timing>
+    <p:tnLst>
+      <p:par>
+        <p:cTn id="1" dur="indefinite" restart="never" nodeType="tmRoot"/>
+      </p:par>
+    </p:tnLst>
+  </p:timing>
 </p:sld>
 </file>
 

</xml_diff>

<commit_message>
#1031: Fix some typo in CodeList.rst
</commit_message>
<xml_diff>
--- a/source/ArchitectureInDetail/images_CodeList/materialCodeList.pptx
+++ b/source/ArchitectureInDetail/images_CodeList/materialCodeList.pptx
@@ -197,7 +197,7 @@
             <a:fld id="{3BB47352-BF5A-4CD2-B029-996118CD8E01}" type="datetimeFigureOut">
               <a:rPr kumimoji="1" lang="ja-JP" altLang="en-US" smtClean="0"/>
               <a:pPr/>
-              <a:t>2014/12/17</a:t>
+              <a:t>2015/7/27</a:t>
             </a:fld>
             <a:endParaRPr kumimoji="1" lang="ja-JP" altLang="en-US" dirty="0"/>
           </a:p>
@@ -680,7 +680,7 @@
             <a:fld id="{7B9B12EC-6AA0-374B-A2D3-850081A07A26}" type="datetimeFigureOut">
               <a:rPr kumimoji="1" lang="ja-JP" altLang="en-US" smtClean="0"/>
               <a:pPr/>
-              <a:t>2014/12/17</a:t>
+              <a:t>2015/7/27</a:t>
             </a:fld>
             <a:endParaRPr kumimoji="1" lang="ja-JP" altLang="en-US" dirty="0"/>
           </a:p>
@@ -884,7 +884,7 @@
             <a:fld id="{7B9B12EC-6AA0-374B-A2D3-850081A07A26}" type="datetimeFigureOut">
               <a:rPr kumimoji="1" lang="ja-JP" altLang="en-US" smtClean="0"/>
               <a:pPr/>
-              <a:t>2014/12/17</a:t>
+              <a:t>2015/7/27</a:t>
             </a:fld>
             <a:endParaRPr kumimoji="1" lang="ja-JP" altLang="en-US" dirty="0"/>
           </a:p>
@@ -1098,7 +1098,7 @@
             <a:fld id="{7B9B12EC-6AA0-374B-A2D3-850081A07A26}" type="datetimeFigureOut">
               <a:rPr kumimoji="1" lang="ja-JP" altLang="en-US" smtClean="0"/>
               <a:pPr/>
-              <a:t>2014/12/17</a:t>
+              <a:t>2015/7/27</a:t>
             </a:fld>
             <a:endParaRPr kumimoji="1" lang="ja-JP" altLang="en-US" dirty="0"/>
           </a:p>
@@ -1302,7 +1302,7 @@
             <a:fld id="{7B9B12EC-6AA0-374B-A2D3-850081A07A26}" type="datetimeFigureOut">
               <a:rPr kumimoji="1" lang="ja-JP" altLang="en-US" smtClean="0"/>
               <a:pPr/>
-              <a:t>2014/12/17</a:t>
+              <a:t>2015/7/27</a:t>
             </a:fld>
             <a:endParaRPr kumimoji="1" lang="ja-JP" altLang="en-US" dirty="0"/>
           </a:p>
@@ -1550,7 +1550,7 @@
             <a:fld id="{7B9B12EC-6AA0-374B-A2D3-850081A07A26}" type="datetimeFigureOut">
               <a:rPr kumimoji="1" lang="ja-JP" altLang="en-US" smtClean="0"/>
               <a:pPr/>
-              <a:t>2014/12/17</a:t>
+              <a:t>2015/7/27</a:t>
             </a:fld>
             <a:endParaRPr kumimoji="1" lang="ja-JP" altLang="en-US" dirty="0"/>
           </a:p>
@@ -1904,7 +1904,7 @@
             <a:fld id="{7B9B12EC-6AA0-374B-A2D3-850081A07A26}" type="datetimeFigureOut">
               <a:rPr kumimoji="1" lang="ja-JP" altLang="en-US" smtClean="0"/>
               <a:pPr/>
-              <a:t>2014/12/17</a:t>
+              <a:t>2015/7/27</a:t>
             </a:fld>
             <a:endParaRPr kumimoji="1" lang="ja-JP" altLang="en-US" dirty="0"/>
           </a:p>
@@ -2392,7 +2392,7 @@
             <a:fld id="{7B9B12EC-6AA0-374B-A2D3-850081A07A26}" type="datetimeFigureOut">
               <a:rPr kumimoji="1" lang="ja-JP" altLang="en-US" smtClean="0"/>
               <a:pPr/>
-              <a:t>2014/12/17</a:t>
+              <a:t>2015/7/27</a:t>
             </a:fld>
             <a:endParaRPr kumimoji="1" lang="ja-JP" altLang="en-US" dirty="0"/>
           </a:p>
@@ -2512,7 +2512,7 @@
             <a:fld id="{7B9B12EC-6AA0-374B-A2D3-850081A07A26}" type="datetimeFigureOut">
               <a:rPr kumimoji="1" lang="ja-JP" altLang="en-US" smtClean="0"/>
               <a:pPr/>
-              <a:t>2014/12/17</a:t>
+              <a:t>2015/7/27</a:t>
             </a:fld>
             <a:endParaRPr kumimoji="1" lang="ja-JP" altLang="en-US" dirty="0"/>
           </a:p>
@@ -2609,7 +2609,7 @@
             <a:fld id="{7B9B12EC-6AA0-374B-A2D3-850081A07A26}" type="datetimeFigureOut">
               <a:rPr kumimoji="1" lang="ja-JP" altLang="en-US" smtClean="0"/>
               <a:pPr/>
-              <a:t>2014/12/17</a:t>
+              <a:t>2015/7/27</a:t>
             </a:fld>
             <a:endParaRPr kumimoji="1" lang="ja-JP" altLang="en-US" dirty="0"/>
           </a:p>
@@ -2920,7 +2920,7 @@
             <a:fld id="{7B9B12EC-6AA0-374B-A2D3-850081A07A26}" type="datetimeFigureOut">
               <a:rPr kumimoji="1" lang="ja-JP" altLang="en-US" smtClean="0"/>
               <a:pPr/>
-              <a:t>2014/12/17</a:t>
+              <a:t>2015/7/27</a:t>
             </a:fld>
             <a:endParaRPr kumimoji="1" lang="ja-JP" altLang="en-US" dirty="0"/>
           </a:p>
@@ -3175,7 +3175,7 @@
             <a:fld id="{7B9B12EC-6AA0-374B-A2D3-850081A07A26}" type="datetimeFigureOut">
               <a:rPr kumimoji="1" lang="ja-JP" altLang="en-US" smtClean="0"/>
               <a:pPr/>
-              <a:t>2014/12/17</a:t>
+              <a:t>2015/7/27</a:t>
             </a:fld>
             <a:endParaRPr kumimoji="1" lang="ja-JP" altLang="en-US" dirty="0"/>
           </a:p>
@@ -3422,7 +3422,7 @@
             <a:fld id="{7B9B12EC-6AA0-374B-A2D3-850081A07A26}" type="datetimeFigureOut">
               <a:rPr kumimoji="1" lang="ja-JP" altLang="en-US" smtClean="0"/>
               <a:pPr/>
-              <a:t>2014/12/17</a:t>
+              <a:t>2015/7/27</a:t>
             </a:fld>
             <a:endParaRPr kumimoji="1" lang="ja-JP" altLang="en-US" dirty="0"/>
           </a:p>
@@ -3860,7 +3860,23 @@
                   <a:schemeClr val="tx1"/>
                 </a:solidFill>
               </a:rPr>
-              <a:t>" class="org.terasoluna.fw.common.codelist.SimpleMapCodeList"&gt;</a:t>
+              <a:t>" class="</a:t>
+            </a:r>
+            <a:r>
+              <a:rPr lang="en-US" sz="1200" b="1" dirty="0" err="1" smtClean="0">
+                <a:solidFill>
+                  <a:schemeClr val="tx1"/>
+                </a:solidFill>
+              </a:rPr>
+              <a:t>org.terasoluna.gfw.common.codelist.SimpleMapCodeList</a:t>
+            </a:r>
+            <a:r>
+              <a:rPr lang="en-US" sz="1200" b="1" dirty="0" smtClean="0">
+                <a:solidFill>
+                  <a:schemeClr val="tx1"/>
+                </a:solidFill>
+              </a:rPr>
+              <a:t>"&gt;</a:t>
             </a:r>
           </a:p>
           <a:p>
@@ -5469,8 +5485,8 @@
         </p:nvSpPr>
         <p:spPr>
           <a:xfrm>
-            <a:off x="590552" y="277812"/>
-            <a:ext cx="4581524" cy="1303339"/>
+            <a:off x="590551" y="277812"/>
+            <a:ext cx="4895847" cy="1303339"/>
           </a:xfrm>
           <a:prstGeom prst="rect">
             <a:avLst/>
@@ -5517,7 +5533,23 @@
                   <a:schemeClr val="tx1"/>
                 </a:solidFill>
               </a:rPr>
-              <a:t>  class="org.terasoluna.fw.common.codelist.NumberRangeCodeList"&gt;</a:t>
+              <a:t>  class="</a:t>
+            </a:r>
+            <a:r>
+              <a:rPr lang="en-US" sz="1200" b="1" dirty="0" err="1" smtClean="0">
+                <a:solidFill>
+                  <a:schemeClr val="tx1"/>
+                </a:solidFill>
+              </a:rPr>
+              <a:t>org.terasoluna.gfw.common.codelist.NumberRangeCodeList</a:t>
+            </a:r>
+            <a:r>
+              <a:rPr lang="en-US" sz="1200" b="1" dirty="0" smtClean="0">
+                <a:solidFill>
+                  <a:schemeClr val="tx1"/>
+                </a:solidFill>
+              </a:rPr>
+              <a:t>"&gt;</a:t>
             </a:r>
           </a:p>
           <a:p>
@@ -9471,7 +9503,23 @@
                   <a:schemeClr val="tx1"/>
                 </a:solidFill>
               </a:rPr>
-              <a:t>&lt;bean id="CL_AUTHORITIES" class="org.terasoluna.fw.common.codelist.JdbcCodeList"&gt;</a:t>
+              <a:t>&lt;bean id="CL_AUTHORITIES" class="</a:t>
+            </a:r>
+            <a:r>
+              <a:rPr lang="en-US" sz="1200" b="1" dirty="0" err="1" smtClean="0">
+                <a:solidFill>
+                  <a:schemeClr val="tx1"/>
+                </a:solidFill>
+              </a:rPr>
+              <a:t>org.terasoluna.gfw.common.codelist.JdbcCodeList</a:t>
+            </a:r>
+            <a:r>
+              <a:rPr lang="en-US" sz="1200" b="1" dirty="0" smtClean="0">
+                <a:solidFill>
+                  <a:schemeClr val="tx1"/>
+                </a:solidFill>
+              </a:rPr>
+              <a:t>"&gt;</a:t>
             </a:r>
           </a:p>
           <a:p>

</xml_diff>